<commit_message>
Changed some slides to match PDF
</commit_message>
<xml_diff>
--- a/DRFL-TD3.pptx
+++ b/DRFL-TD3.pptx
@@ -5,48 +5,49 @@
     <p:sldMasterId id="2147483648" r:id="rId1"/>
   </p:sldMasterIdLst>
   <p:notesMasterIdLst>
-    <p:notesMasterId r:id="rId38"/>
+    <p:notesMasterId r:id="rId39"/>
   </p:notesMasterIdLst>
   <p:handoutMasterIdLst>
-    <p:handoutMasterId r:id="rId39"/>
+    <p:handoutMasterId r:id="rId40"/>
   </p:handoutMasterIdLst>
   <p:sldIdLst>
     <p:sldId id="259" r:id="rId2"/>
     <p:sldId id="260" r:id="rId3"/>
     <p:sldId id="262" r:id="rId4"/>
-    <p:sldId id="266" r:id="rId5"/>
-    <p:sldId id="263" r:id="rId6"/>
-    <p:sldId id="267" r:id="rId7"/>
-    <p:sldId id="264" r:id="rId8"/>
-    <p:sldId id="268" r:id="rId9"/>
-    <p:sldId id="265" r:id="rId10"/>
-    <p:sldId id="287" r:id="rId11"/>
-    <p:sldId id="269" r:id="rId12"/>
-    <p:sldId id="271" r:id="rId13"/>
-    <p:sldId id="273" r:id="rId14"/>
-    <p:sldId id="272" r:id="rId15"/>
-    <p:sldId id="274" r:id="rId16"/>
-    <p:sldId id="275" r:id="rId17"/>
-    <p:sldId id="276" r:id="rId18"/>
-    <p:sldId id="277" r:id="rId19"/>
-    <p:sldId id="294" r:id="rId20"/>
-    <p:sldId id="278" r:id="rId21"/>
-    <p:sldId id="270" r:id="rId22"/>
-    <p:sldId id="293" r:id="rId23"/>
-    <p:sldId id="289" r:id="rId24"/>
-    <p:sldId id="292" r:id="rId25"/>
-    <p:sldId id="295" r:id="rId26"/>
-    <p:sldId id="291" r:id="rId27"/>
-    <p:sldId id="290" r:id="rId28"/>
-    <p:sldId id="279" r:id="rId29"/>
-    <p:sldId id="288" r:id="rId30"/>
-    <p:sldId id="280" r:id="rId31"/>
-    <p:sldId id="281" r:id="rId32"/>
-    <p:sldId id="282" r:id="rId33"/>
-    <p:sldId id="283" r:id="rId34"/>
-    <p:sldId id="284" r:id="rId35"/>
-    <p:sldId id="286" r:id="rId36"/>
-    <p:sldId id="261" r:id="rId37"/>
+    <p:sldId id="296" r:id="rId5"/>
+    <p:sldId id="266" r:id="rId6"/>
+    <p:sldId id="263" r:id="rId7"/>
+    <p:sldId id="267" r:id="rId8"/>
+    <p:sldId id="264" r:id="rId9"/>
+    <p:sldId id="268" r:id="rId10"/>
+    <p:sldId id="265" r:id="rId11"/>
+    <p:sldId id="287" r:id="rId12"/>
+    <p:sldId id="269" r:id="rId13"/>
+    <p:sldId id="271" r:id="rId14"/>
+    <p:sldId id="273" r:id="rId15"/>
+    <p:sldId id="272" r:id="rId16"/>
+    <p:sldId id="274" r:id="rId17"/>
+    <p:sldId id="275" r:id="rId18"/>
+    <p:sldId id="276" r:id="rId19"/>
+    <p:sldId id="277" r:id="rId20"/>
+    <p:sldId id="294" r:id="rId21"/>
+    <p:sldId id="278" r:id="rId22"/>
+    <p:sldId id="270" r:id="rId23"/>
+    <p:sldId id="293" r:id="rId24"/>
+    <p:sldId id="289" r:id="rId25"/>
+    <p:sldId id="292" r:id="rId26"/>
+    <p:sldId id="295" r:id="rId27"/>
+    <p:sldId id="291" r:id="rId28"/>
+    <p:sldId id="290" r:id="rId29"/>
+    <p:sldId id="279" r:id="rId30"/>
+    <p:sldId id="288" r:id="rId31"/>
+    <p:sldId id="280" r:id="rId32"/>
+    <p:sldId id="281" r:id="rId33"/>
+    <p:sldId id="282" r:id="rId34"/>
+    <p:sldId id="283" r:id="rId35"/>
+    <p:sldId id="284" r:id="rId36"/>
+    <p:sldId id="286" r:id="rId37"/>
+    <p:sldId id="261" r:id="rId38"/>
   </p:sldIdLst>
   <p:sldSz cx="9144000" cy="6858000" type="screen4x3"/>
   <p:notesSz cx="6794500" cy="10007600"/>
@@ -969,7 +970,7 @@
             <a:fld id="{AB5AA983-2186-40A3-92EE-FB13A7732978}" type="slidenum">
               <a:rPr lang="de-DE" smtClean="0"/>
               <a:pPr/>
-              <a:t>11</a:t>
+              <a:t>12</a:t>
             </a:fld>
             <a:endParaRPr lang="de-DE"/>
           </a:p>
@@ -1054,7 +1055,7 @@
             <a:fld id="{AB5AA983-2186-40A3-92EE-FB13A7732978}" type="slidenum">
               <a:rPr lang="de-DE" smtClean="0"/>
               <a:pPr/>
-              <a:t>13</a:t>
+              <a:t>14</a:t>
             </a:fld>
             <a:endParaRPr lang="de-DE"/>
           </a:p>
@@ -1139,7 +1140,7 @@
             <a:fld id="{AB5AA983-2186-40A3-92EE-FB13A7732978}" type="slidenum">
               <a:rPr lang="de-DE" smtClean="0"/>
               <a:pPr/>
-              <a:t>15</a:t>
+              <a:t>16</a:t>
             </a:fld>
             <a:endParaRPr lang="de-DE"/>
           </a:p>
@@ -1224,7 +1225,7 @@
             <a:fld id="{AB5AA983-2186-40A3-92EE-FB13A7732978}" type="slidenum">
               <a:rPr lang="de-DE" smtClean="0"/>
               <a:pPr/>
-              <a:t>17</a:t>
+              <a:t>18</a:t>
             </a:fld>
             <a:endParaRPr lang="de-DE"/>
           </a:p>
@@ -1320,7 +1321,7 @@
             <a:fld id="{AB5AA983-2186-40A3-92EE-FB13A7732978}" type="slidenum">
               <a:rPr lang="de-DE" smtClean="0"/>
               <a:pPr/>
-              <a:t>18</a:t>
+              <a:t>19</a:t>
             </a:fld>
             <a:endParaRPr lang="de-DE"/>
           </a:p>
@@ -1405,7 +1406,7 @@
             <a:fld id="{AB5AA983-2186-40A3-92EE-FB13A7732978}" type="slidenum">
               <a:rPr lang="de-DE" smtClean="0"/>
               <a:pPr/>
-              <a:t>20</a:t>
+              <a:t>21</a:t>
             </a:fld>
             <a:endParaRPr lang="de-DE"/>
           </a:p>
@@ -1493,7 +1494,7 @@
             <a:fld id="{AB5AA983-2186-40A3-92EE-FB13A7732978}" type="slidenum">
               <a:rPr lang="de-DE" smtClean="0"/>
               <a:pPr/>
-              <a:t>23</a:t>
+              <a:t>24</a:t>
             </a:fld>
             <a:endParaRPr lang="de-DE"/>
           </a:p>
@@ -1578,7 +1579,7 @@
             <a:fld id="{AB5AA983-2186-40A3-92EE-FB13A7732978}" type="slidenum">
               <a:rPr lang="de-DE" smtClean="0"/>
               <a:pPr/>
-              <a:t>26</a:t>
+              <a:t>27</a:t>
             </a:fld>
             <a:endParaRPr lang="de-DE"/>
           </a:p>
@@ -1663,7 +1664,7 @@
             <a:fld id="{AB5AA983-2186-40A3-92EE-FB13A7732978}" type="slidenum">
               <a:rPr lang="de-DE" smtClean="0"/>
               <a:pPr/>
-              <a:t>28</a:t>
+              <a:t>29</a:t>
             </a:fld>
             <a:endParaRPr lang="de-DE"/>
           </a:p>
@@ -1748,7 +1749,7 @@
             <a:fld id="{AB5AA983-2186-40A3-92EE-FB13A7732978}" type="slidenum">
               <a:rPr lang="de-DE" smtClean="0"/>
               <a:pPr/>
-              <a:t>29</a:t>
+              <a:t>30</a:t>
             </a:fld>
             <a:endParaRPr lang="de-DE"/>
           </a:p>
@@ -1938,7 +1939,7 @@
             <a:fld id="{AB5AA983-2186-40A3-92EE-FB13A7732978}" type="slidenum">
               <a:rPr lang="de-DE" smtClean="0"/>
               <a:pPr/>
-              <a:t>31</a:t>
+              <a:t>32</a:t>
             </a:fld>
             <a:endParaRPr lang="de-DE"/>
           </a:p>
@@ -2023,7 +2024,7 @@
             <a:fld id="{AB5AA983-2186-40A3-92EE-FB13A7732978}" type="slidenum">
               <a:rPr lang="de-DE" smtClean="0"/>
               <a:pPr/>
-              <a:t>33</a:t>
+              <a:t>34</a:t>
             </a:fld>
             <a:endParaRPr lang="de-DE"/>
           </a:p>
@@ -2849,7 +2850,7 @@
             <a:fld id="{AB5AA983-2186-40A3-92EE-FB13A7732978}" type="slidenum">
               <a:rPr lang="de-DE" smtClean="0"/>
               <a:pPr/>
-              <a:t>4</a:t>
+              <a:t>5</a:t>
             </a:fld>
             <a:endParaRPr lang="de-DE"/>
           </a:p>
@@ -2934,7 +2935,7 @@
             <a:fld id="{AB5AA983-2186-40A3-92EE-FB13A7732978}" type="slidenum">
               <a:rPr lang="de-DE" smtClean="0"/>
               <a:pPr/>
-              <a:t>5</a:t>
+              <a:t>6</a:t>
             </a:fld>
             <a:endParaRPr lang="de-DE"/>
           </a:p>
@@ -3038,7 +3039,7 @@
             <a:fld id="{AB5AA983-2186-40A3-92EE-FB13A7732978}" type="slidenum">
               <a:rPr lang="de-DE" smtClean="0"/>
               <a:pPr/>
-              <a:t>6</a:t>
+              <a:t>7</a:t>
             </a:fld>
             <a:endParaRPr lang="de-DE"/>
           </a:p>
@@ -3736,7 +3737,7 @@
             <a:fld id="{AB5AA983-2186-40A3-92EE-FB13A7732978}" type="slidenum">
               <a:rPr lang="de-DE" smtClean="0"/>
               <a:pPr/>
-              <a:t>8</a:t>
+              <a:t>9</a:t>
             </a:fld>
             <a:endParaRPr lang="de-DE"/>
           </a:p>
@@ -3857,7 +3858,7 @@
             <a:fld id="{AB5AA983-2186-40A3-92EE-FB13A7732978}" type="slidenum">
               <a:rPr lang="de-DE" smtClean="0"/>
               <a:pPr/>
-              <a:t>9</a:t>
+              <a:t>10</a:t>
             </a:fld>
             <a:endParaRPr lang="de-DE"/>
           </a:p>
@@ -3978,7 +3979,7 @@
             <a:fld id="{AB5AA983-2186-40A3-92EE-FB13A7732978}" type="slidenum">
               <a:rPr lang="de-DE" smtClean="0"/>
               <a:pPr/>
-              <a:t>10</a:t>
+              <a:t>11</a:t>
             </a:fld>
             <a:endParaRPr lang="de-DE"/>
           </a:p>
@@ -5885,13 +5886,8 @@
           <a:p>
             <a:r>
               <a:rPr lang="de-DE" dirty="0"/>
-              <a:t>Experiment: Swing a </a:t>
-            </a:r>
-            <a:r>
-              <a:rPr lang="de-DE" dirty="0" err="1"/>
-              <a:t>Pendulum</a:t>
-            </a:r>
-            <a:endParaRPr lang="de-DE" dirty="0"/>
+              <a:t>Experiment Setup</a:t>
+            </a:r>
           </a:p>
         </p:txBody>
       </p:sp>
@@ -5922,24 +5918,12 @@
           <a:lstStyle/>
           <a:p>
             <a:r>
-              <a:rPr lang="de-DE" dirty="0"/>
-              <a:t>„ In </a:t>
-            </a:r>
-            <a:r>
-              <a:rPr lang="de-DE" dirty="0" err="1"/>
-              <a:t>this</a:t>
-            </a:r>
-            <a:r>
-              <a:rPr lang="de-DE" dirty="0"/>
-              <a:t> </a:t>
-            </a:r>
-            <a:r>
-              <a:rPr lang="de-DE" dirty="0" err="1"/>
-              <a:t>version</a:t>
-            </a:r>
-            <a:r>
-              <a:rPr lang="de-DE" dirty="0"/>
-              <a:t> </a:t>
+              <a:rPr lang="de-DE" dirty="0" err="1"/>
+              <a:t>Algorithm</a:t>
+            </a:r>
+            <a:r>
+              <a:rPr lang="de-DE" dirty="0"/>
+              <a:t>: TD3 </a:t>
             </a:r>
             <a:r>
               <a:rPr lang="de-DE" dirty="0" err="1"/>
@@ -5951,253 +5935,130 @@
             </a:r>
             <a:r>
               <a:rPr lang="de-DE" dirty="0" err="1"/>
-              <a:t>the</a:t>
-            </a:r>
-            <a:r>
-              <a:rPr lang="de-DE" dirty="0"/>
-              <a:t> </a:t>
-            </a:r>
-            <a:r>
-              <a:rPr lang="de-DE" dirty="0" err="1"/>
-              <a:t>problem</a:t>
-            </a:r>
-            <a:r>
-              <a:rPr lang="de-DE" dirty="0"/>
-              <a:t>, </a:t>
-            </a:r>
-            <a:r>
-              <a:rPr lang="de-DE" dirty="0" err="1"/>
-              <a:t>the</a:t>
-            </a:r>
-            <a:r>
-              <a:rPr lang="de-DE" dirty="0"/>
-              <a:t> </a:t>
-            </a:r>
-            <a:r>
-              <a:rPr lang="de-DE" dirty="0" err="1"/>
-              <a:t>pendulum</a:t>
-            </a:r>
-            <a:r>
-              <a:rPr lang="de-DE" dirty="0"/>
-              <a:t> </a:t>
-            </a:r>
-            <a:r>
-              <a:rPr lang="de-DE" dirty="0" err="1"/>
-              <a:t>starts</a:t>
-            </a:r>
-            <a:r>
-              <a:rPr lang="de-DE" dirty="0"/>
-              <a:t> in a </a:t>
-            </a:r>
-            <a:r>
-              <a:rPr lang="de-DE" dirty="0" err="1"/>
-              <a:t>random</a:t>
-            </a:r>
-            <a:r>
-              <a:rPr lang="de-DE" dirty="0"/>
-              <a:t> </a:t>
-            </a:r>
-            <a:r>
-              <a:rPr lang="de-DE" dirty="0" err="1"/>
-              <a:t>position</a:t>
-            </a:r>
-            <a:r>
-              <a:rPr lang="de-DE" dirty="0"/>
-              <a:t>, </a:t>
-            </a:r>
-            <a:r>
-              <a:rPr lang="de-DE" dirty="0" err="1"/>
-              <a:t>and</a:t>
-            </a:r>
-            <a:r>
-              <a:rPr lang="de-DE" dirty="0"/>
-              <a:t> </a:t>
-            </a:r>
-            <a:r>
-              <a:rPr lang="de-DE" dirty="0" err="1"/>
-              <a:t>the</a:t>
-            </a:r>
-            <a:r>
-              <a:rPr lang="de-DE" dirty="0"/>
-              <a:t> </a:t>
-            </a:r>
-            <a:r>
-              <a:rPr lang="de-DE" dirty="0" err="1"/>
-              <a:t>goal</a:t>
-            </a:r>
-            <a:r>
-              <a:rPr lang="de-DE" dirty="0"/>
-              <a:t> </a:t>
-            </a:r>
-            <a:r>
-              <a:rPr lang="de-DE" dirty="0" err="1"/>
-              <a:t>is</a:t>
-            </a:r>
-            <a:r>
-              <a:rPr lang="de-DE" dirty="0"/>
-              <a:t> </a:t>
-            </a:r>
-            <a:r>
-              <a:rPr lang="de-DE" dirty="0" err="1"/>
-              <a:t>to</a:t>
-            </a:r>
-            <a:r>
-              <a:rPr lang="de-DE" dirty="0"/>
-              <a:t> swing </a:t>
-            </a:r>
-            <a:r>
-              <a:rPr lang="de-DE" dirty="0" err="1"/>
-              <a:t>it</a:t>
-            </a:r>
-            <a:r>
-              <a:rPr lang="de-DE" dirty="0"/>
-              <a:t> </a:t>
-            </a:r>
-            <a:r>
-              <a:rPr lang="de-DE" dirty="0" err="1"/>
-              <a:t>up</a:t>
-            </a:r>
-            <a:r>
-              <a:rPr lang="de-DE" dirty="0"/>
-              <a:t> so </a:t>
-            </a:r>
-            <a:r>
-              <a:rPr lang="de-DE" dirty="0" err="1"/>
-              <a:t>it</a:t>
-            </a:r>
-            <a:r>
-              <a:rPr lang="de-DE" dirty="0"/>
-              <a:t> </a:t>
-            </a:r>
-            <a:r>
-              <a:rPr lang="de-DE" dirty="0" err="1"/>
-              <a:t>stays</a:t>
-            </a:r>
-            <a:r>
-              <a:rPr lang="de-DE" dirty="0"/>
-              <a:t> </a:t>
-            </a:r>
-            <a:r>
-              <a:rPr lang="de-DE" dirty="0" err="1"/>
-              <a:t>upright</a:t>
-            </a:r>
-            <a:r>
-              <a:rPr lang="de-DE" dirty="0"/>
-              <a:t>.“ [6]</a:t>
-            </a:r>
-          </a:p>
-          <a:p>
-            <a:r>
-              <a:rPr lang="de-DE" dirty="0"/>
-              <a:t>First </a:t>
-            </a:r>
-            <a:r>
-              <a:rPr lang="de-DE" dirty="0" err="1"/>
-              <a:t>run</a:t>
+              <a:t>stable-baselines</a:t>
+            </a:r>
+            <a:r>
+              <a:rPr lang="de-DE" dirty="0"/>
+              <a:t> </a:t>
+            </a:r>
+          </a:p>
+          <a:p>
+            <a:r>
+              <a:rPr lang="de-DE" dirty="0" err="1"/>
+              <a:t>Pendulum</a:t>
+            </a:r>
+            <a:r>
+              <a:rPr lang="de-DE" dirty="0"/>
+              <a:t> </a:t>
+            </a:r>
+            <a:r>
+              <a:rPr lang="de-DE" dirty="0" err="1"/>
+              <a:t>Env</a:t>
+            </a:r>
+            <a:r>
+              <a:rPr lang="de-DE" dirty="0"/>
+              <a:t> </a:t>
+            </a:r>
+            <a:r>
+              <a:rPr lang="de-DE" dirty="0" err="1"/>
+              <a:t>from</a:t>
+            </a:r>
+            <a:r>
+              <a:rPr lang="de-DE" dirty="0"/>
+              <a:t> </a:t>
+            </a:r>
+            <a:r>
+              <a:rPr lang="de-DE" dirty="0" err="1"/>
+              <a:t>OpenAI</a:t>
+            </a:r>
+            <a:r>
+              <a:rPr lang="de-DE" dirty="0"/>
+              <a:t> </a:t>
+            </a:r>
+            <a:r>
+              <a:rPr lang="de-DE" dirty="0" err="1"/>
+              <a:t>Gym</a:t>
             </a:r>
             <a:endParaRPr lang="de-DE" dirty="0"/>
           </a:p>
           <a:p>
-            <a:pPr lvl="1"/>
-            <a:r>
-              <a:rPr lang="de-DE" dirty="0"/>
-              <a:t>Standard Settings</a:t>
-            </a:r>
-          </a:p>
-          <a:p>
-            <a:pPr lvl="1"/>
-            <a:r>
-              <a:rPr lang="de-DE" dirty="0"/>
-              <a:t>50000 </a:t>
-            </a:r>
-            <a:r>
-              <a:rPr lang="de-DE" dirty="0" err="1"/>
-              <a:t>timesteps</a:t>
+            <a:r>
+              <a:rPr lang="de-DE" dirty="0" err="1"/>
+              <a:t>Ant</a:t>
+            </a:r>
+            <a:r>
+              <a:rPr lang="de-DE" dirty="0"/>
+              <a:t> </a:t>
+            </a:r>
+            <a:r>
+              <a:rPr lang="de-DE" dirty="0" err="1"/>
+              <a:t>Env</a:t>
+            </a:r>
+            <a:r>
+              <a:rPr lang="de-DE" dirty="0"/>
+              <a:t> </a:t>
+            </a:r>
+            <a:r>
+              <a:rPr lang="de-DE" dirty="0" err="1"/>
+              <a:t>from</a:t>
+            </a:r>
+            <a:r>
+              <a:rPr lang="de-DE" dirty="0"/>
+              <a:t> </a:t>
+            </a:r>
+            <a:r>
+              <a:rPr lang="de-DE" dirty="0" err="1"/>
+              <a:t>PyBullet</a:t>
+            </a:r>
+            <a:r>
+              <a:rPr lang="de-DE" dirty="0"/>
+              <a:t> </a:t>
+            </a:r>
+            <a:r>
+              <a:rPr lang="de-DE" dirty="0" err="1"/>
+              <a:t>Gym</a:t>
+            </a:r>
+            <a:r>
+              <a:rPr lang="de-DE" dirty="0"/>
+              <a:t> </a:t>
+            </a:r>
+          </a:p>
+          <a:p>
+            <a:r>
+              <a:rPr lang="de-DE" dirty="0" err="1"/>
+              <a:t>Running</a:t>
+            </a:r>
+            <a:r>
+              <a:rPr lang="de-DE" dirty="0"/>
+              <a:t> on Google </a:t>
+            </a:r>
+            <a:r>
+              <a:rPr lang="de-DE" dirty="0" err="1"/>
+              <a:t>Colab</a:t>
             </a:r>
             <a:endParaRPr lang="de-DE" dirty="0"/>
           </a:p>
           <a:p>
             <a:r>
-              <a:rPr lang="de-DE" dirty="0"/>
-              <a:t>Second </a:t>
-            </a:r>
-            <a:r>
-              <a:rPr lang="de-DE" dirty="0" err="1"/>
-              <a:t>run</a:t>
-            </a:r>
-            <a:endParaRPr lang="de-DE" dirty="0"/>
-          </a:p>
-          <a:p>
-            <a:pPr lvl="1"/>
-            <a:r>
-              <a:rPr lang="de-DE" dirty="0"/>
-              <a:t>High Noise</a:t>
-            </a:r>
-          </a:p>
-          <a:p>
-            <a:r>
-              <a:rPr lang="de-DE" dirty="0"/>
-              <a:t>Third </a:t>
-            </a:r>
-            <a:r>
-              <a:rPr lang="de-DE" dirty="0" err="1"/>
-              <a:t>run</a:t>
-            </a:r>
-            <a:endParaRPr lang="de-DE" dirty="0"/>
-          </a:p>
-          <a:p>
-            <a:pPr lvl="1"/>
-            <a:r>
-              <a:rPr lang="de-DE" dirty="0"/>
-              <a:t>Higher </a:t>
-            </a:r>
-            <a:r>
-              <a:rPr lang="de-DE" dirty="0" err="1"/>
-              <a:t>learning</a:t>
-            </a:r>
-            <a:r>
-              <a:rPr lang="de-DE" dirty="0"/>
-              <a:t> rate</a:t>
-            </a:r>
-          </a:p>
-          <a:p>
-            <a:r>
-              <a:rPr lang="de-DE" dirty="0" err="1"/>
-              <a:t>Fourth</a:t>
-            </a:r>
-            <a:r>
-              <a:rPr lang="de-DE" dirty="0"/>
-              <a:t> </a:t>
-            </a:r>
-            <a:r>
-              <a:rPr lang="de-DE" dirty="0" err="1"/>
-              <a:t>run</a:t>
-            </a:r>
-            <a:endParaRPr lang="de-DE" dirty="0"/>
-          </a:p>
-          <a:p>
-            <a:pPr lvl="1"/>
-            <a:r>
-              <a:rPr lang="de-DE" dirty="0" err="1"/>
-              <a:t>Very</a:t>
-            </a:r>
-            <a:r>
-              <a:rPr lang="de-DE" dirty="0"/>
-              <a:t> high </a:t>
-            </a:r>
-            <a:r>
-              <a:rPr lang="de-DE" dirty="0" err="1"/>
-              <a:t>learning</a:t>
-            </a:r>
-            <a:r>
-              <a:rPr lang="de-DE" dirty="0"/>
-              <a:t> rate</a:t>
-            </a:r>
-          </a:p>
-          <a:p>
-            <a:pPr marL="0" indent="0">
-              <a:buNone/>
-            </a:pPr>
+              <a:rPr lang="de-DE" dirty="0" err="1"/>
+              <a:t>Logging</a:t>
+            </a:r>
+            <a:r>
+              <a:rPr lang="de-DE" dirty="0"/>
+              <a:t> </a:t>
+            </a:r>
+            <a:r>
+              <a:rPr lang="de-DE" dirty="0" err="1"/>
+              <a:t>with</a:t>
+            </a:r>
+            <a:r>
+              <a:rPr lang="de-DE" dirty="0"/>
+              <a:t> </a:t>
+            </a:r>
+            <a:r>
+              <a:rPr lang="de-DE" dirty="0" err="1"/>
+              <a:t>Tensorboard</a:t>
+            </a:r>
             <a:endParaRPr lang="de-DE" dirty="0"/>
           </a:p>
         </p:txBody>
@@ -6284,6 +6145,741 @@
               <a:rPr lang="de-DE" smtClean="0"/>
               <a:pPr/>
               <a:t>10</a:t>
+            </a:fld>
+            <a:endParaRPr lang="de-DE"/>
+          </a:p>
+        </p:txBody>
+      </p:sp>
+    </p:spTree>
+    <p:extLst>
+      <p:ext uri="{BB962C8B-B14F-4D97-AF65-F5344CB8AC3E}">
+        <p14:creationId xmlns:p14="http://schemas.microsoft.com/office/powerpoint/2010/main" val="429526192"/>
+      </p:ext>
+    </p:extLst>
+  </p:cSld>
+  <p:clrMapOvr>
+    <a:masterClrMapping/>
+  </p:clrMapOvr>
+  <p:timing>
+    <p:tnLst>
+      <p:par>
+        <p:cTn id="1" dur="indefinite" restart="never" nodeType="tmRoot">
+          <p:childTnLst>
+            <p:seq concurrent="1" nextAc="seek">
+              <p:cTn id="2" dur="indefinite" nodeType="mainSeq">
+                <p:childTnLst>
+                  <p:par>
+                    <p:cTn id="3" fill="hold">
+                      <p:stCondLst>
+                        <p:cond delay="indefinite"/>
+                      </p:stCondLst>
+                      <p:childTnLst>
+                        <p:par>
+                          <p:cTn id="4" fill="hold">
+                            <p:stCondLst>
+                              <p:cond delay="0"/>
+                            </p:stCondLst>
+                            <p:childTnLst>
+                              <p:par>
+                                <p:cTn id="5" presetID="1" presetClass="entr" presetSubtype="0" fill="hold" grpId="0" nodeType="clickEffect">
+                                  <p:stCondLst>
+                                    <p:cond delay="0"/>
+                                  </p:stCondLst>
+                                  <p:childTnLst>
+                                    <p:set>
+                                      <p:cBhvr>
+                                        <p:cTn id="6" dur="1" fill="hold">
+                                          <p:stCondLst>
+                                            <p:cond delay="0"/>
+                                          </p:stCondLst>
+                                        </p:cTn>
+                                        <p:tgtEl>
+                                          <p:spTgt spid="3">
+                                            <p:txEl>
+                                              <p:pRg st="0" end="0"/>
+                                            </p:txEl>
+                                          </p:spTgt>
+                                        </p:tgtEl>
+                                        <p:attrNameLst>
+                                          <p:attrName>style.visibility</p:attrName>
+                                        </p:attrNameLst>
+                                      </p:cBhvr>
+                                      <p:to>
+                                        <p:strVal val="visible"/>
+                                      </p:to>
+                                    </p:set>
+                                  </p:childTnLst>
+                                </p:cTn>
+                              </p:par>
+                            </p:childTnLst>
+                          </p:cTn>
+                        </p:par>
+                      </p:childTnLst>
+                    </p:cTn>
+                  </p:par>
+                  <p:par>
+                    <p:cTn id="7" fill="hold">
+                      <p:stCondLst>
+                        <p:cond delay="indefinite"/>
+                      </p:stCondLst>
+                      <p:childTnLst>
+                        <p:par>
+                          <p:cTn id="8" fill="hold">
+                            <p:stCondLst>
+                              <p:cond delay="0"/>
+                            </p:stCondLst>
+                            <p:childTnLst>
+                              <p:par>
+                                <p:cTn id="9" presetID="1" presetClass="entr" presetSubtype="0" fill="hold" grpId="0" nodeType="clickEffect">
+                                  <p:stCondLst>
+                                    <p:cond delay="0"/>
+                                  </p:stCondLst>
+                                  <p:childTnLst>
+                                    <p:set>
+                                      <p:cBhvr>
+                                        <p:cTn id="10" dur="1" fill="hold">
+                                          <p:stCondLst>
+                                            <p:cond delay="0"/>
+                                          </p:stCondLst>
+                                        </p:cTn>
+                                        <p:tgtEl>
+                                          <p:spTgt spid="3">
+                                            <p:txEl>
+                                              <p:pRg st="1" end="1"/>
+                                            </p:txEl>
+                                          </p:spTgt>
+                                        </p:tgtEl>
+                                        <p:attrNameLst>
+                                          <p:attrName>style.visibility</p:attrName>
+                                        </p:attrNameLst>
+                                      </p:cBhvr>
+                                      <p:to>
+                                        <p:strVal val="visible"/>
+                                      </p:to>
+                                    </p:set>
+                                  </p:childTnLst>
+                                </p:cTn>
+                              </p:par>
+                            </p:childTnLst>
+                          </p:cTn>
+                        </p:par>
+                      </p:childTnLst>
+                    </p:cTn>
+                  </p:par>
+                  <p:par>
+                    <p:cTn id="11" fill="hold">
+                      <p:stCondLst>
+                        <p:cond delay="indefinite"/>
+                      </p:stCondLst>
+                      <p:childTnLst>
+                        <p:par>
+                          <p:cTn id="12" fill="hold">
+                            <p:stCondLst>
+                              <p:cond delay="0"/>
+                            </p:stCondLst>
+                            <p:childTnLst>
+                              <p:par>
+                                <p:cTn id="13" presetID="1" presetClass="entr" presetSubtype="0" fill="hold" grpId="0" nodeType="clickEffect">
+                                  <p:stCondLst>
+                                    <p:cond delay="0"/>
+                                  </p:stCondLst>
+                                  <p:childTnLst>
+                                    <p:set>
+                                      <p:cBhvr>
+                                        <p:cTn id="14" dur="1" fill="hold">
+                                          <p:stCondLst>
+                                            <p:cond delay="0"/>
+                                          </p:stCondLst>
+                                        </p:cTn>
+                                        <p:tgtEl>
+                                          <p:spTgt spid="3">
+                                            <p:txEl>
+                                              <p:pRg st="2" end="2"/>
+                                            </p:txEl>
+                                          </p:spTgt>
+                                        </p:tgtEl>
+                                        <p:attrNameLst>
+                                          <p:attrName>style.visibility</p:attrName>
+                                        </p:attrNameLst>
+                                      </p:cBhvr>
+                                      <p:to>
+                                        <p:strVal val="visible"/>
+                                      </p:to>
+                                    </p:set>
+                                  </p:childTnLst>
+                                </p:cTn>
+                              </p:par>
+                            </p:childTnLst>
+                          </p:cTn>
+                        </p:par>
+                      </p:childTnLst>
+                    </p:cTn>
+                  </p:par>
+                  <p:par>
+                    <p:cTn id="15" fill="hold">
+                      <p:stCondLst>
+                        <p:cond delay="indefinite"/>
+                      </p:stCondLst>
+                      <p:childTnLst>
+                        <p:par>
+                          <p:cTn id="16" fill="hold">
+                            <p:stCondLst>
+                              <p:cond delay="0"/>
+                            </p:stCondLst>
+                            <p:childTnLst>
+                              <p:par>
+                                <p:cTn id="17" presetID="1" presetClass="entr" presetSubtype="0" fill="hold" grpId="0" nodeType="clickEffect">
+                                  <p:stCondLst>
+                                    <p:cond delay="0"/>
+                                  </p:stCondLst>
+                                  <p:childTnLst>
+                                    <p:set>
+                                      <p:cBhvr>
+                                        <p:cTn id="18" dur="1" fill="hold">
+                                          <p:stCondLst>
+                                            <p:cond delay="0"/>
+                                          </p:stCondLst>
+                                        </p:cTn>
+                                        <p:tgtEl>
+                                          <p:spTgt spid="3">
+                                            <p:txEl>
+                                              <p:pRg st="3" end="3"/>
+                                            </p:txEl>
+                                          </p:spTgt>
+                                        </p:tgtEl>
+                                        <p:attrNameLst>
+                                          <p:attrName>style.visibility</p:attrName>
+                                        </p:attrNameLst>
+                                      </p:cBhvr>
+                                      <p:to>
+                                        <p:strVal val="visible"/>
+                                      </p:to>
+                                    </p:set>
+                                  </p:childTnLst>
+                                </p:cTn>
+                              </p:par>
+                            </p:childTnLst>
+                          </p:cTn>
+                        </p:par>
+                      </p:childTnLst>
+                    </p:cTn>
+                  </p:par>
+                  <p:par>
+                    <p:cTn id="19" fill="hold">
+                      <p:stCondLst>
+                        <p:cond delay="indefinite"/>
+                      </p:stCondLst>
+                      <p:childTnLst>
+                        <p:par>
+                          <p:cTn id="20" fill="hold">
+                            <p:stCondLst>
+                              <p:cond delay="0"/>
+                            </p:stCondLst>
+                            <p:childTnLst>
+                              <p:par>
+                                <p:cTn id="21" presetID="1" presetClass="entr" presetSubtype="0" fill="hold" grpId="0" nodeType="clickEffect">
+                                  <p:stCondLst>
+                                    <p:cond delay="0"/>
+                                  </p:stCondLst>
+                                  <p:childTnLst>
+                                    <p:set>
+                                      <p:cBhvr>
+                                        <p:cTn id="22" dur="1" fill="hold">
+                                          <p:stCondLst>
+                                            <p:cond delay="0"/>
+                                          </p:stCondLst>
+                                        </p:cTn>
+                                        <p:tgtEl>
+                                          <p:spTgt spid="3">
+                                            <p:txEl>
+                                              <p:pRg st="4" end="4"/>
+                                            </p:txEl>
+                                          </p:spTgt>
+                                        </p:tgtEl>
+                                        <p:attrNameLst>
+                                          <p:attrName>style.visibility</p:attrName>
+                                        </p:attrNameLst>
+                                      </p:cBhvr>
+                                      <p:to>
+                                        <p:strVal val="visible"/>
+                                      </p:to>
+                                    </p:set>
+                                  </p:childTnLst>
+                                </p:cTn>
+                              </p:par>
+                            </p:childTnLst>
+                          </p:cTn>
+                        </p:par>
+                      </p:childTnLst>
+                    </p:cTn>
+                  </p:par>
+                </p:childTnLst>
+              </p:cTn>
+              <p:prevCondLst>
+                <p:cond evt="onPrev" delay="0">
+                  <p:tgtEl>
+                    <p:sldTgt/>
+                  </p:tgtEl>
+                </p:cond>
+              </p:prevCondLst>
+              <p:nextCondLst>
+                <p:cond evt="onNext" delay="0">
+                  <p:tgtEl>
+                    <p:sldTgt/>
+                  </p:tgtEl>
+                </p:cond>
+              </p:nextCondLst>
+            </p:seq>
+          </p:childTnLst>
+        </p:cTn>
+      </p:par>
+    </p:tnLst>
+    <p:bldLst>
+      <p:bldP spid="3" grpId="0" build="p"/>
+    </p:bldLst>
+  </p:timing>
+</p:sld>
+</file>
+
+<file path=ppt/slides/slide11.xml><?xml version="1.0" encoding="utf-8"?>
+<p:sld xmlns:a="http://schemas.openxmlformats.org/drawingml/2006/main" xmlns:r="http://schemas.openxmlformats.org/officeDocument/2006/relationships" xmlns:p="http://schemas.openxmlformats.org/presentationml/2006/main">
+  <p:cSld>
+    <p:spTree>
+      <p:nvGrpSpPr>
+        <p:cNvPr id="1" name=""/>
+        <p:cNvGrpSpPr/>
+        <p:nvPr/>
+      </p:nvGrpSpPr>
+      <p:grpSpPr>
+        <a:xfrm>
+          <a:off x="0" y="0"/>
+          <a:ext cx="0" cy="0"/>
+          <a:chOff x="0" y="0"/>
+          <a:chExt cx="0" cy="0"/>
+        </a:xfrm>
+      </p:grpSpPr>
+      <p:sp>
+        <p:nvSpPr>
+          <p:cNvPr id="2" name="Title 1">
+            <a:extLst>
+              <a:ext uri="{FF2B5EF4-FFF2-40B4-BE49-F238E27FC236}">
+                <a16:creationId xmlns:a16="http://schemas.microsoft.com/office/drawing/2014/main" id="{DF865123-2C10-BF4A-BF77-9B54C236C756}"/>
+              </a:ext>
+            </a:extLst>
+          </p:cNvPr>
+          <p:cNvSpPr>
+            <a:spLocks noGrp="1"/>
+          </p:cNvSpPr>
+          <p:nvPr>
+            <p:ph type="title"/>
+          </p:nvPr>
+        </p:nvSpPr>
+        <p:spPr/>
+        <p:txBody>
+          <a:bodyPr/>
+          <a:lstStyle/>
+          <a:p>
+            <a:r>
+              <a:rPr lang="de-DE" dirty="0"/>
+              <a:t>Experiment: Swing a </a:t>
+            </a:r>
+            <a:r>
+              <a:rPr lang="de-DE" dirty="0" err="1"/>
+              <a:t>Pendulum</a:t>
+            </a:r>
+            <a:endParaRPr lang="de-DE" dirty="0"/>
+          </a:p>
+        </p:txBody>
+      </p:sp>
+      <p:sp>
+        <p:nvSpPr>
+          <p:cNvPr id="3" name="Content Placeholder 2">
+            <a:extLst>
+              <a:ext uri="{FF2B5EF4-FFF2-40B4-BE49-F238E27FC236}">
+                <a16:creationId xmlns:a16="http://schemas.microsoft.com/office/drawing/2014/main" id="{CDEA8190-97B7-3842-9323-4F53B7DC0BFC}"/>
+              </a:ext>
+            </a:extLst>
+          </p:cNvPr>
+          <p:cNvSpPr>
+            <a:spLocks noGrp="1"/>
+          </p:cNvSpPr>
+          <p:nvPr>
+            <p:ph sz="half" idx="1"/>
+          </p:nvPr>
+        </p:nvSpPr>
+        <p:spPr>
+          <a:xfrm>
+            <a:off x="445760" y="1701006"/>
+            <a:ext cx="8183563" cy="4319587"/>
+          </a:xfrm>
+        </p:spPr>
+        <p:txBody>
+          <a:bodyPr/>
+          <a:lstStyle/>
+          <a:p>
+            <a:r>
+              <a:rPr lang="de-DE" dirty="0"/>
+              <a:t>„ In </a:t>
+            </a:r>
+            <a:r>
+              <a:rPr lang="de-DE" dirty="0" err="1"/>
+              <a:t>this</a:t>
+            </a:r>
+            <a:r>
+              <a:rPr lang="de-DE" dirty="0"/>
+              <a:t> </a:t>
+            </a:r>
+            <a:r>
+              <a:rPr lang="de-DE" dirty="0" err="1"/>
+              <a:t>version</a:t>
+            </a:r>
+            <a:r>
+              <a:rPr lang="de-DE" dirty="0"/>
+              <a:t> </a:t>
+            </a:r>
+            <a:r>
+              <a:rPr lang="de-DE" dirty="0" err="1"/>
+              <a:t>of</a:t>
+            </a:r>
+            <a:r>
+              <a:rPr lang="de-DE" dirty="0"/>
+              <a:t> </a:t>
+            </a:r>
+            <a:r>
+              <a:rPr lang="de-DE" dirty="0" err="1"/>
+              <a:t>the</a:t>
+            </a:r>
+            <a:r>
+              <a:rPr lang="de-DE" dirty="0"/>
+              <a:t> </a:t>
+            </a:r>
+            <a:r>
+              <a:rPr lang="de-DE" dirty="0" err="1"/>
+              <a:t>problem</a:t>
+            </a:r>
+            <a:r>
+              <a:rPr lang="de-DE" dirty="0"/>
+              <a:t>, </a:t>
+            </a:r>
+            <a:r>
+              <a:rPr lang="de-DE" dirty="0" err="1"/>
+              <a:t>the</a:t>
+            </a:r>
+            <a:r>
+              <a:rPr lang="de-DE" dirty="0"/>
+              <a:t> </a:t>
+            </a:r>
+            <a:r>
+              <a:rPr lang="de-DE" dirty="0" err="1"/>
+              <a:t>pendulum</a:t>
+            </a:r>
+            <a:r>
+              <a:rPr lang="de-DE" dirty="0"/>
+              <a:t> </a:t>
+            </a:r>
+            <a:r>
+              <a:rPr lang="de-DE" dirty="0" err="1"/>
+              <a:t>starts</a:t>
+            </a:r>
+            <a:r>
+              <a:rPr lang="de-DE" dirty="0"/>
+              <a:t> in a </a:t>
+            </a:r>
+            <a:r>
+              <a:rPr lang="de-DE" dirty="0" err="1"/>
+              <a:t>random</a:t>
+            </a:r>
+            <a:r>
+              <a:rPr lang="de-DE" dirty="0"/>
+              <a:t> </a:t>
+            </a:r>
+            <a:r>
+              <a:rPr lang="de-DE" dirty="0" err="1"/>
+              <a:t>position</a:t>
+            </a:r>
+            <a:r>
+              <a:rPr lang="de-DE" dirty="0"/>
+              <a:t>, </a:t>
+            </a:r>
+            <a:r>
+              <a:rPr lang="de-DE" dirty="0" err="1"/>
+              <a:t>and</a:t>
+            </a:r>
+            <a:r>
+              <a:rPr lang="de-DE" dirty="0"/>
+              <a:t> </a:t>
+            </a:r>
+            <a:r>
+              <a:rPr lang="de-DE" dirty="0" err="1"/>
+              <a:t>the</a:t>
+            </a:r>
+            <a:r>
+              <a:rPr lang="de-DE" dirty="0"/>
+              <a:t> </a:t>
+            </a:r>
+            <a:r>
+              <a:rPr lang="de-DE" dirty="0" err="1"/>
+              <a:t>goal</a:t>
+            </a:r>
+            <a:r>
+              <a:rPr lang="de-DE" dirty="0"/>
+              <a:t> </a:t>
+            </a:r>
+            <a:r>
+              <a:rPr lang="de-DE" dirty="0" err="1"/>
+              <a:t>is</a:t>
+            </a:r>
+            <a:r>
+              <a:rPr lang="de-DE" dirty="0"/>
+              <a:t> </a:t>
+            </a:r>
+            <a:r>
+              <a:rPr lang="de-DE" dirty="0" err="1"/>
+              <a:t>to</a:t>
+            </a:r>
+            <a:r>
+              <a:rPr lang="de-DE" dirty="0"/>
+              <a:t> swing </a:t>
+            </a:r>
+            <a:r>
+              <a:rPr lang="de-DE" dirty="0" err="1"/>
+              <a:t>it</a:t>
+            </a:r>
+            <a:r>
+              <a:rPr lang="de-DE" dirty="0"/>
+              <a:t> </a:t>
+            </a:r>
+            <a:r>
+              <a:rPr lang="de-DE" dirty="0" err="1"/>
+              <a:t>up</a:t>
+            </a:r>
+            <a:r>
+              <a:rPr lang="de-DE" dirty="0"/>
+              <a:t> so </a:t>
+            </a:r>
+            <a:r>
+              <a:rPr lang="de-DE" dirty="0" err="1"/>
+              <a:t>it</a:t>
+            </a:r>
+            <a:r>
+              <a:rPr lang="de-DE" dirty="0"/>
+              <a:t> </a:t>
+            </a:r>
+            <a:r>
+              <a:rPr lang="de-DE" dirty="0" err="1"/>
+              <a:t>stays</a:t>
+            </a:r>
+            <a:r>
+              <a:rPr lang="de-DE" dirty="0"/>
+              <a:t> </a:t>
+            </a:r>
+            <a:r>
+              <a:rPr lang="de-DE" dirty="0" err="1"/>
+              <a:t>upright</a:t>
+            </a:r>
+            <a:r>
+              <a:rPr lang="de-DE" dirty="0"/>
+              <a:t>.“ [6]</a:t>
+            </a:r>
+          </a:p>
+          <a:p>
+            <a:r>
+              <a:rPr lang="de-DE" dirty="0"/>
+              <a:t>First </a:t>
+            </a:r>
+            <a:r>
+              <a:rPr lang="de-DE" dirty="0" err="1"/>
+              <a:t>run</a:t>
+            </a:r>
+            <a:endParaRPr lang="de-DE" dirty="0"/>
+          </a:p>
+          <a:p>
+            <a:pPr lvl="1"/>
+            <a:r>
+              <a:rPr lang="de-DE" dirty="0"/>
+              <a:t>Standard Settings</a:t>
+            </a:r>
+          </a:p>
+          <a:p>
+            <a:pPr lvl="1"/>
+            <a:r>
+              <a:rPr lang="de-DE" dirty="0"/>
+              <a:t>50000 </a:t>
+            </a:r>
+            <a:r>
+              <a:rPr lang="de-DE" dirty="0" err="1"/>
+              <a:t>timesteps</a:t>
+            </a:r>
+            <a:endParaRPr lang="de-DE" dirty="0"/>
+          </a:p>
+          <a:p>
+            <a:r>
+              <a:rPr lang="de-DE" dirty="0"/>
+              <a:t>Second </a:t>
+            </a:r>
+            <a:r>
+              <a:rPr lang="de-DE" dirty="0" err="1"/>
+              <a:t>run</a:t>
+            </a:r>
+            <a:endParaRPr lang="de-DE" dirty="0"/>
+          </a:p>
+          <a:p>
+            <a:pPr lvl="1"/>
+            <a:r>
+              <a:rPr lang="de-DE" dirty="0"/>
+              <a:t>High Noise</a:t>
+            </a:r>
+          </a:p>
+          <a:p>
+            <a:r>
+              <a:rPr lang="de-DE" dirty="0"/>
+              <a:t>Third </a:t>
+            </a:r>
+            <a:r>
+              <a:rPr lang="de-DE" dirty="0" err="1"/>
+              <a:t>run</a:t>
+            </a:r>
+            <a:endParaRPr lang="de-DE" dirty="0"/>
+          </a:p>
+          <a:p>
+            <a:pPr lvl="1"/>
+            <a:r>
+              <a:rPr lang="de-DE" dirty="0"/>
+              <a:t>Higher </a:t>
+            </a:r>
+            <a:r>
+              <a:rPr lang="de-DE" dirty="0" err="1"/>
+              <a:t>learning</a:t>
+            </a:r>
+            <a:r>
+              <a:rPr lang="de-DE" dirty="0"/>
+              <a:t> rate</a:t>
+            </a:r>
+          </a:p>
+          <a:p>
+            <a:r>
+              <a:rPr lang="de-DE" dirty="0" err="1"/>
+              <a:t>Fourth</a:t>
+            </a:r>
+            <a:r>
+              <a:rPr lang="de-DE" dirty="0"/>
+              <a:t> </a:t>
+            </a:r>
+            <a:r>
+              <a:rPr lang="de-DE" dirty="0" err="1"/>
+              <a:t>run</a:t>
+            </a:r>
+            <a:endParaRPr lang="de-DE" dirty="0"/>
+          </a:p>
+          <a:p>
+            <a:pPr lvl="1"/>
+            <a:r>
+              <a:rPr lang="de-DE" dirty="0" err="1"/>
+              <a:t>Very</a:t>
+            </a:r>
+            <a:r>
+              <a:rPr lang="de-DE" dirty="0"/>
+              <a:t> high </a:t>
+            </a:r>
+            <a:r>
+              <a:rPr lang="de-DE" dirty="0" err="1"/>
+              <a:t>learning</a:t>
+            </a:r>
+            <a:r>
+              <a:rPr lang="de-DE" dirty="0"/>
+              <a:t> rate</a:t>
+            </a:r>
+          </a:p>
+          <a:p>
+            <a:pPr marL="0" indent="0">
+              <a:buNone/>
+            </a:pPr>
+            <a:endParaRPr lang="de-DE" dirty="0"/>
+          </a:p>
+        </p:txBody>
+      </p:sp>
+      <p:sp>
+        <p:nvSpPr>
+          <p:cNvPr id="5" name="Date Placeholder 4">
+            <a:extLst>
+              <a:ext uri="{FF2B5EF4-FFF2-40B4-BE49-F238E27FC236}">
+                <a16:creationId xmlns:a16="http://schemas.microsoft.com/office/drawing/2014/main" id="{627465B1-4176-084B-9F72-6B1F144F719E}"/>
+              </a:ext>
+            </a:extLst>
+          </p:cNvPr>
+          <p:cNvSpPr>
+            <a:spLocks noGrp="1"/>
+          </p:cNvSpPr>
+          <p:nvPr>
+            <p:ph type="dt" sz="half" idx="10"/>
+          </p:nvPr>
+        </p:nvSpPr>
+        <p:spPr/>
+        <p:txBody>
+          <a:bodyPr/>
+          <a:lstStyle/>
+          <a:p>
+            <a:r>
+              <a:rPr lang="de-DE"/>
+              <a:t>15. Januar 2020</a:t>
+            </a:r>
+          </a:p>
+        </p:txBody>
+      </p:sp>
+      <p:sp>
+        <p:nvSpPr>
+          <p:cNvPr id="6" name="Footer Placeholder 5">
+            <a:extLst>
+              <a:ext uri="{FF2B5EF4-FFF2-40B4-BE49-F238E27FC236}">
+                <a16:creationId xmlns:a16="http://schemas.microsoft.com/office/drawing/2014/main" id="{C55863B1-EF29-9F40-85EA-CEAE4DB87186}"/>
+              </a:ext>
+            </a:extLst>
+          </p:cNvPr>
+          <p:cNvSpPr>
+            <a:spLocks noGrp="1"/>
+          </p:cNvSpPr>
+          <p:nvPr>
+            <p:ph type="ftr" sz="quarter" idx="11"/>
+          </p:nvPr>
+        </p:nvSpPr>
+        <p:spPr/>
+        <p:txBody>
+          <a:bodyPr/>
+          <a:lstStyle/>
+          <a:p>
+            <a:r>
+              <a:rPr lang="de-DE" b="1"/>
+              <a:t>Deep Reinforcement Learning: TD3</a:t>
+            </a:r>
+            <a:endParaRPr lang="de-DE" b="1" dirty="0"/>
+          </a:p>
+        </p:txBody>
+      </p:sp>
+      <p:sp>
+        <p:nvSpPr>
+          <p:cNvPr id="7" name="Slide Number Placeholder 6">
+            <a:extLst>
+              <a:ext uri="{FF2B5EF4-FFF2-40B4-BE49-F238E27FC236}">
+                <a16:creationId xmlns:a16="http://schemas.microsoft.com/office/drawing/2014/main" id="{2652E1AA-712F-CD4C-9955-CA08C5790D94}"/>
+              </a:ext>
+            </a:extLst>
+          </p:cNvPr>
+          <p:cNvSpPr>
+            <a:spLocks noGrp="1"/>
+          </p:cNvSpPr>
+          <p:nvPr>
+            <p:ph type="sldNum" sz="quarter" idx="12"/>
+          </p:nvPr>
+        </p:nvSpPr>
+        <p:spPr/>
+        <p:txBody>
+          <a:bodyPr/>
+          <a:lstStyle/>
+          <a:p>
+            <a:fld id="{8C8FEA95-401B-4A59-A0C9-740C061053CF}" type="slidenum">
+              <a:rPr lang="de-DE" smtClean="0"/>
+              <a:pPr/>
+              <a:t>11</a:t>
             </a:fld>
             <a:endParaRPr lang="de-DE"/>
           </a:p>
@@ -6735,7 +7331,7 @@
 </p:sld>
 </file>
 
-<file path=ppt/slides/slide11.xml><?xml version="1.0" encoding="utf-8"?>
+<file path=ppt/slides/slide12.xml><?xml version="1.0" encoding="utf-8"?>
 <p:sld xmlns:a="http://schemas.openxmlformats.org/drawingml/2006/main" xmlns:r="http://schemas.openxmlformats.org/officeDocument/2006/relationships" xmlns:p="http://schemas.openxmlformats.org/presentationml/2006/main">
   <p:cSld>
     <p:spTree>
@@ -6896,7 +7492,7 @@
             <a:fld id="{8C8FEA95-401B-4A59-A0C9-740C061053CF}" type="slidenum">
               <a:rPr lang="de-DE" smtClean="0"/>
               <a:pPr/>
-              <a:t>11</a:t>
+              <a:t>12</a:t>
             </a:fld>
             <a:endParaRPr lang="de-DE"/>
           </a:p>
@@ -6997,7 +7593,7 @@
 </p:sld>
 </file>
 
-<file path=ppt/slides/slide12.xml><?xml version="1.0" encoding="utf-8"?>
+<file path=ppt/slides/slide13.xml><?xml version="1.0" encoding="utf-8"?>
 <p:sld xmlns:a="http://schemas.openxmlformats.org/drawingml/2006/main" xmlns:r="http://schemas.openxmlformats.org/officeDocument/2006/relationships" xmlns:p="http://schemas.openxmlformats.org/presentationml/2006/main">
   <p:cSld>
     <p:spTree>
@@ -7159,7 +7755,7 @@
             <a:fld id="{8C8FEA95-401B-4A59-A0C9-740C061053CF}" type="slidenum">
               <a:rPr lang="de-DE" smtClean="0"/>
               <a:pPr/>
-              <a:t>12</a:t>
+              <a:t>13</a:t>
             </a:fld>
             <a:endParaRPr lang="de-DE"/>
           </a:p>
@@ -7313,7 +7909,7 @@
 </p:sld>
 </file>
 
-<file path=ppt/slides/slide13.xml><?xml version="1.0" encoding="utf-8"?>
+<file path=ppt/slides/slide14.xml><?xml version="1.0" encoding="utf-8"?>
 <p:sld xmlns:a="http://schemas.openxmlformats.org/drawingml/2006/main" xmlns:r="http://schemas.openxmlformats.org/officeDocument/2006/relationships" xmlns:p="http://schemas.openxmlformats.org/presentationml/2006/main">
   <p:cSld>
     <p:spTree>
@@ -7477,7 +8073,7 @@
             <a:fld id="{8C8FEA95-401B-4A59-A0C9-740C061053CF}" type="slidenum">
               <a:rPr lang="de-DE" smtClean="0"/>
               <a:pPr/>
-              <a:t>13</a:t>
+              <a:t>14</a:t>
             </a:fld>
             <a:endParaRPr lang="de-DE"/>
           </a:p>
@@ -7578,7 +8174,7 @@
 </p:sld>
 </file>
 
-<file path=ppt/slides/slide14.xml><?xml version="1.0" encoding="utf-8"?>
+<file path=ppt/slides/slide15.xml><?xml version="1.0" encoding="utf-8"?>
 <p:sld xmlns:a="http://schemas.openxmlformats.org/drawingml/2006/main" xmlns:r="http://schemas.openxmlformats.org/officeDocument/2006/relationships" xmlns:p="http://schemas.openxmlformats.org/presentationml/2006/main">
   <p:cSld>
     <p:spTree>
@@ -7740,7 +8336,7 @@
             <a:fld id="{8C8FEA95-401B-4A59-A0C9-740C061053CF}" type="slidenum">
               <a:rPr lang="de-DE" smtClean="0"/>
               <a:pPr/>
-              <a:t>14</a:t>
+              <a:t>15</a:t>
             </a:fld>
             <a:endParaRPr lang="de-DE"/>
           </a:p>
@@ -7894,7 +8490,7 @@
 </p:sld>
 </file>
 
-<file path=ppt/slides/slide15.xml><?xml version="1.0" encoding="utf-8"?>
+<file path=ppt/slides/slide16.xml><?xml version="1.0" encoding="utf-8"?>
 <p:sld xmlns:a="http://schemas.openxmlformats.org/drawingml/2006/main" xmlns:r="http://schemas.openxmlformats.org/officeDocument/2006/relationships" xmlns:p="http://schemas.openxmlformats.org/presentationml/2006/main">
   <p:cSld>
     <p:spTree>
@@ -8058,7 +8654,7 @@
             <a:fld id="{8C8FEA95-401B-4A59-A0C9-740C061053CF}" type="slidenum">
               <a:rPr lang="de-DE" smtClean="0"/>
               <a:pPr/>
-              <a:t>15</a:t>
+              <a:t>16</a:t>
             </a:fld>
             <a:endParaRPr lang="de-DE"/>
           </a:p>
@@ -8159,7 +8755,7 @@
 </p:sld>
 </file>
 
-<file path=ppt/slides/slide16.xml><?xml version="1.0" encoding="utf-8"?>
+<file path=ppt/slides/slide17.xml><?xml version="1.0" encoding="utf-8"?>
 <p:sld xmlns:a="http://schemas.openxmlformats.org/drawingml/2006/main" xmlns:r="http://schemas.openxmlformats.org/officeDocument/2006/relationships" xmlns:p="http://schemas.openxmlformats.org/presentationml/2006/main">
   <p:cSld>
     <p:spTree>
@@ -8285,7 +8881,7 @@
             <a:fld id="{8C8FEA95-401B-4A59-A0C9-740C061053CF}" type="slidenum">
               <a:rPr lang="de-DE" smtClean="0"/>
               <a:pPr/>
-              <a:t>16</a:t>
+              <a:t>17</a:t>
             </a:fld>
             <a:endParaRPr lang="de-DE"/>
           </a:p>
@@ -8475,7 +9071,7 @@
 </p:sld>
 </file>
 
-<file path=ppt/slides/slide17.xml><?xml version="1.0" encoding="utf-8"?>
+<file path=ppt/slides/slide18.xml><?xml version="1.0" encoding="utf-8"?>
 <p:sld xmlns:a="http://schemas.openxmlformats.org/drawingml/2006/main" xmlns:r="http://schemas.openxmlformats.org/officeDocument/2006/relationships" xmlns:p="http://schemas.openxmlformats.org/presentationml/2006/main">
   <p:cSld>
     <p:spTree>
@@ -8639,7 +9235,7 @@
             <a:fld id="{8C8FEA95-401B-4A59-A0C9-740C061053CF}" type="slidenum">
               <a:rPr lang="de-DE" smtClean="0"/>
               <a:pPr/>
-              <a:t>17</a:t>
+              <a:t>18</a:t>
             </a:fld>
             <a:endParaRPr lang="de-DE"/>
           </a:p>
@@ -8740,7 +9336,7 @@
 </p:sld>
 </file>
 
-<file path=ppt/slides/slide18.xml><?xml version="1.0" encoding="utf-8"?>
+<file path=ppt/slides/slide19.xml><?xml version="1.0" encoding="utf-8"?>
 <p:sld xmlns:a="http://schemas.openxmlformats.org/drawingml/2006/main" xmlns:r="http://schemas.openxmlformats.org/officeDocument/2006/relationships" xmlns:p="http://schemas.openxmlformats.org/presentationml/2006/main">
   <p:cSld>
     <p:spTree>
@@ -8866,7 +9462,7 @@
             <a:fld id="{8C8FEA95-401B-4A59-A0C9-740C061053CF}" type="slidenum">
               <a:rPr lang="de-DE" smtClean="0"/>
               <a:pPr/>
-              <a:t>18</a:t>
+              <a:t>19</a:t>
             </a:fld>
             <a:endParaRPr lang="de-DE"/>
           </a:p>
@@ -9053,161 +9649,6 @@
       </p:par>
     </p:tnLst>
   </p:timing>
-</p:sld>
-</file>
-
-<file path=ppt/slides/slide19.xml><?xml version="1.0" encoding="utf-8"?>
-<p:sld xmlns:a="http://schemas.openxmlformats.org/drawingml/2006/main" xmlns:r="http://schemas.openxmlformats.org/officeDocument/2006/relationships" xmlns:p="http://schemas.openxmlformats.org/presentationml/2006/main">
-  <p:cSld>
-    <p:spTree>
-      <p:nvGrpSpPr>
-        <p:cNvPr id="1" name=""/>
-        <p:cNvGrpSpPr/>
-        <p:nvPr/>
-      </p:nvGrpSpPr>
-      <p:grpSpPr>
-        <a:xfrm>
-          <a:off x="0" y="0"/>
-          <a:ext cx="0" cy="0"/>
-          <a:chOff x="0" y="0"/>
-          <a:chExt cx="0" cy="0"/>
-        </a:xfrm>
-      </p:grpSpPr>
-      <p:sp>
-        <p:nvSpPr>
-          <p:cNvPr id="2" name="Title 1">
-            <a:extLst>
-              <a:ext uri="{FF2B5EF4-FFF2-40B4-BE49-F238E27FC236}">
-                <a16:creationId xmlns:a16="http://schemas.microsoft.com/office/drawing/2014/main" id="{23503C44-684B-884F-9B9D-A3ED482BC201}"/>
-              </a:ext>
-            </a:extLst>
-          </p:cNvPr>
-          <p:cNvSpPr>
-            <a:spLocks noGrp="1"/>
-          </p:cNvSpPr>
-          <p:nvPr>
-            <p:ph type="title"/>
-          </p:nvPr>
-        </p:nvSpPr>
-        <p:spPr>
-          <a:xfrm>
-            <a:off x="469120" y="2531580"/>
-            <a:ext cx="6707188" cy="863600"/>
-          </a:xfrm>
-        </p:spPr>
-        <p:txBody>
-          <a:bodyPr/>
-          <a:lstStyle/>
-          <a:p>
-            <a:r>
-              <a:rPr lang="de-DE" dirty="0"/>
-              <a:t>Higher </a:t>
-            </a:r>
-            <a:r>
-              <a:rPr lang="de-DE" dirty="0" err="1"/>
-              <a:t>noise</a:t>
-            </a:r>
-            <a:endParaRPr lang="de-DE" dirty="0"/>
-          </a:p>
-        </p:txBody>
-      </p:sp>
-      <p:sp>
-        <p:nvSpPr>
-          <p:cNvPr id="5" name="Date Placeholder 4">
-            <a:extLst>
-              <a:ext uri="{FF2B5EF4-FFF2-40B4-BE49-F238E27FC236}">
-                <a16:creationId xmlns:a16="http://schemas.microsoft.com/office/drawing/2014/main" id="{4936C492-F944-E845-AE61-774A067BC983}"/>
-              </a:ext>
-            </a:extLst>
-          </p:cNvPr>
-          <p:cNvSpPr>
-            <a:spLocks noGrp="1"/>
-          </p:cNvSpPr>
-          <p:nvPr>
-            <p:ph type="dt" sz="half" idx="10"/>
-          </p:nvPr>
-        </p:nvSpPr>
-        <p:spPr/>
-        <p:txBody>
-          <a:bodyPr/>
-          <a:lstStyle/>
-          <a:p>
-            <a:r>
-              <a:rPr lang="de-DE"/>
-              <a:t>15. Januar 2020</a:t>
-            </a:r>
-          </a:p>
-        </p:txBody>
-      </p:sp>
-      <p:sp>
-        <p:nvSpPr>
-          <p:cNvPr id="6" name="Footer Placeholder 5">
-            <a:extLst>
-              <a:ext uri="{FF2B5EF4-FFF2-40B4-BE49-F238E27FC236}">
-                <a16:creationId xmlns:a16="http://schemas.microsoft.com/office/drawing/2014/main" id="{B7B536D2-86D4-894D-AF99-254C78515A68}"/>
-              </a:ext>
-            </a:extLst>
-          </p:cNvPr>
-          <p:cNvSpPr>
-            <a:spLocks noGrp="1"/>
-          </p:cNvSpPr>
-          <p:nvPr>
-            <p:ph type="ftr" sz="quarter" idx="11"/>
-          </p:nvPr>
-        </p:nvSpPr>
-        <p:spPr/>
-        <p:txBody>
-          <a:bodyPr/>
-          <a:lstStyle/>
-          <a:p>
-            <a:r>
-              <a:rPr lang="de-DE" b="1"/>
-              <a:t>Deep Reinforcement Learning: TD3</a:t>
-            </a:r>
-            <a:endParaRPr lang="de-DE" b="1" dirty="0"/>
-          </a:p>
-        </p:txBody>
-      </p:sp>
-      <p:sp>
-        <p:nvSpPr>
-          <p:cNvPr id="7" name="Slide Number Placeholder 6">
-            <a:extLst>
-              <a:ext uri="{FF2B5EF4-FFF2-40B4-BE49-F238E27FC236}">
-                <a16:creationId xmlns:a16="http://schemas.microsoft.com/office/drawing/2014/main" id="{540EBBAA-F0F5-464C-B77A-416179AF79A9}"/>
-              </a:ext>
-            </a:extLst>
-          </p:cNvPr>
-          <p:cNvSpPr>
-            <a:spLocks noGrp="1"/>
-          </p:cNvSpPr>
-          <p:nvPr>
-            <p:ph type="sldNum" sz="quarter" idx="12"/>
-          </p:nvPr>
-        </p:nvSpPr>
-        <p:spPr/>
-        <p:txBody>
-          <a:bodyPr/>
-          <a:lstStyle/>
-          <a:p>
-            <a:fld id="{8C8FEA95-401B-4A59-A0C9-740C061053CF}" type="slidenum">
-              <a:rPr lang="de-DE" smtClean="0"/>
-              <a:pPr/>
-              <a:t>19</a:t>
-            </a:fld>
-            <a:endParaRPr lang="de-DE"/>
-          </a:p>
-        </p:txBody>
-      </p:sp>
-    </p:spTree>
-    <p:extLst>
-      <p:ext uri="{BB962C8B-B14F-4D97-AF65-F5344CB8AC3E}">
-        <p14:creationId xmlns:p14="http://schemas.microsoft.com/office/powerpoint/2010/main" val="1269375288"/>
-      </p:ext>
-    </p:extLst>
-  </p:cSld>
-  <p:clrMapOvr>
-    <a:masterClrMapping/>
-  </p:clrMapOvr>
 </p:sld>
 </file>
 
@@ -9856,6 +10297,161 @@
           <p:cNvPr id="2" name="Title 1">
             <a:extLst>
               <a:ext uri="{FF2B5EF4-FFF2-40B4-BE49-F238E27FC236}">
+                <a16:creationId xmlns:a16="http://schemas.microsoft.com/office/drawing/2014/main" id="{23503C44-684B-884F-9B9D-A3ED482BC201}"/>
+              </a:ext>
+            </a:extLst>
+          </p:cNvPr>
+          <p:cNvSpPr>
+            <a:spLocks noGrp="1"/>
+          </p:cNvSpPr>
+          <p:nvPr>
+            <p:ph type="title"/>
+          </p:nvPr>
+        </p:nvSpPr>
+        <p:spPr>
+          <a:xfrm>
+            <a:off x="469120" y="2531580"/>
+            <a:ext cx="6707188" cy="863600"/>
+          </a:xfrm>
+        </p:spPr>
+        <p:txBody>
+          <a:bodyPr/>
+          <a:lstStyle/>
+          <a:p>
+            <a:r>
+              <a:rPr lang="de-DE" dirty="0"/>
+              <a:t>Higher </a:t>
+            </a:r>
+            <a:r>
+              <a:rPr lang="de-DE" dirty="0" err="1"/>
+              <a:t>noise</a:t>
+            </a:r>
+            <a:endParaRPr lang="de-DE" dirty="0"/>
+          </a:p>
+        </p:txBody>
+      </p:sp>
+      <p:sp>
+        <p:nvSpPr>
+          <p:cNvPr id="5" name="Date Placeholder 4">
+            <a:extLst>
+              <a:ext uri="{FF2B5EF4-FFF2-40B4-BE49-F238E27FC236}">
+                <a16:creationId xmlns:a16="http://schemas.microsoft.com/office/drawing/2014/main" id="{4936C492-F944-E845-AE61-774A067BC983}"/>
+              </a:ext>
+            </a:extLst>
+          </p:cNvPr>
+          <p:cNvSpPr>
+            <a:spLocks noGrp="1"/>
+          </p:cNvSpPr>
+          <p:nvPr>
+            <p:ph type="dt" sz="half" idx="10"/>
+          </p:nvPr>
+        </p:nvSpPr>
+        <p:spPr/>
+        <p:txBody>
+          <a:bodyPr/>
+          <a:lstStyle/>
+          <a:p>
+            <a:r>
+              <a:rPr lang="de-DE"/>
+              <a:t>15. Januar 2020</a:t>
+            </a:r>
+          </a:p>
+        </p:txBody>
+      </p:sp>
+      <p:sp>
+        <p:nvSpPr>
+          <p:cNvPr id="6" name="Footer Placeholder 5">
+            <a:extLst>
+              <a:ext uri="{FF2B5EF4-FFF2-40B4-BE49-F238E27FC236}">
+                <a16:creationId xmlns:a16="http://schemas.microsoft.com/office/drawing/2014/main" id="{B7B536D2-86D4-894D-AF99-254C78515A68}"/>
+              </a:ext>
+            </a:extLst>
+          </p:cNvPr>
+          <p:cNvSpPr>
+            <a:spLocks noGrp="1"/>
+          </p:cNvSpPr>
+          <p:nvPr>
+            <p:ph type="ftr" sz="quarter" idx="11"/>
+          </p:nvPr>
+        </p:nvSpPr>
+        <p:spPr/>
+        <p:txBody>
+          <a:bodyPr/>
+          <a:lstStyle/>
+          <a:p>
+            <a:r>
+              <a:rPr lang="de-DE" b="1"/>
+              <a:t>Deep Reinforcement Learning: TD3</a:t>
+            </a:r>
+            <a:endParaRPr lang="de-DE" b="1" dirty="0"/>
+          </a:p>
+        </p:txBody>
+      </p:sp>
+      <p:sp>
+        <p:nvSpPr>
+          <p:cNvPr id="7" name="Slide Number Placeholder 6">
+            <a:extLst>
+              <a:ext uri="{FF2B5EF4-FFF2-40B4-BE49-F238E27FC236}">
+                <a16:creationId xmlns:a16="http://schemas.microsoft.com/office/drawing/2014/main" id="{540EBBAA-F0F5-464C-B77A-416179AF79A9}"/>
+              </a:ext>
+            </a:extLst>
+          </p:cNvPr>
+          <p:cNvSpPr>
+            <a:spLocks noGrp="1"/>
+          </p:cNvSpPr>
+          <p:nvPr>
+            <p:ph type="sldNum" sz="quarter" idx="12"/>
+          </p:nvPr>
+        </p:nvSpPr>
+        <p:spPr/>
+        <p:txBody>
+          <a:bodyPr/>
+          <a:lstStyle/>
+          <a:p>
+            <a:fld id="{8C8FEA95-401B-4A59-A0C9-740C061053CF}" type="slidenum">
+              <a:rPr lang="de-DE" smtClean="0"/>
+              <a:pPr/>
+              <a:t>20</a:t>
+            </a:fld>
+            <a:endParaRPr lang="de-DE"/>
+          </a:p>
+        </p:txBody>
+      </p:sp>
+    </p:spTree>
+    <p:extLst>
+      <p:ext uri="{BB962C8B-B14F-4D97-AF65-F5344CB8AC3E}">
+        <p14:creationId xmlns:p14="http://schemas.microsoft.com/office/powerpoint/2010/main" val="1269375288"/>
+      </p:ext>
+    </p:extLst>
+  </p:cSld>
+  <p:clrMapOvr>
+    <a:masterClrMapping/>
+  </p:clrMapOvr>
+</p:sld>
+</file>
+
+<file path=ppt/slides/slide21.xml><?xml version="1.0" encoding="utf-8"?>
+<p:sld xmlns:a="http://schemas.openxmlformats.org/drawingml/2006/main" xmlns:r="http://schemas.openxmlformats.org/officeDocument/2006/relationships" xmlns:p="http://schemas.openxmlformats.org/presentationml/2006/main">
+  <p:cSld>
+    <p:spTree>
+      <p:nvGrpSpPr>
+        <p:cNvPr id="1" name=""/>
+        <p:cNvGrpSpPr/>
+        <p:nvPr/>
+      </p:nvGrpSpPr>
+      <p:grpSpPr>
+        <a:xfrm>
+          <a:off x="0" y="0"/>
+          <a:ext cx="0" cy="0"/>
+          <a:chOff x="0" y="0"/>
+          <a:chExt cx="0" cy="0"/>
+        </a:xfrm>
+      </p:grpSpPr>
+      <p:sp>
+        <p:nvSpPr>
+          <p:cNvPr id="2" name="Title 1">
+            <a:extLst>
+              <a:ext uri="{FF2B5EF4-FFF2-40B4-BE49-F238E27FC236}">
                 <a16:creationId xmlns:a16="http://schemas.microsoft.com/office/drawing/2014/main" id="{13EDCF36-2B3D-7B4B-B557-639994418F60}"/>
               </a:ext>
             </a:extLst>
@@ -9993,7 +10589,7 @@
             <a:fld id="{8C8FEA95-401B-4A59-A0C9-740C061053CF}" type="slidenum">
               <a:rPr lang="de-DE" smtClean="0"/>
               <a:pPr/>
-              <a:t>20</a:t>
+              <a:t>21</a:t>
             </a:fld>
             <a:endParaRPr lang="de-DE"/>
           </a:p>
@@ -10094,7 +10690,7 @@
 </p:sld>
 </file>
 
-<file path=ppt/slides/slide21.xml><?xml version="1.0" encoding="utf-8"?>
+<file path=ppt/slides/slide22.xml><?xml version="1.0" encoding="utf-8"?>
 <p:sld xmlns:a="http://schemas.openxmlformats.org/drawingml/2006/main" xmlns:r="http://schemas.openxmlformats.org/officeDocument/2006/relationships" xmlns:p="http://schemas.openxmlformats.org/presentationml/2006/main">
   <p:cSld>
     <p:spTree>
@@ -10220,7 +10816,7 @@
             <a:fld id="{8C8FEA95-401B-4A59-A0C9-740C061053CF}" type="slidenum">
               <a:rPr lang="de-DE" smtClean="0"/>
               <a:pPr/>
-              <a:t>21</a:t>
+              <a:t>22</a:t>
             </a:fld>
             <a:endParaRPr lang="de-DE"/>
           </a:p>
@@ -10410,164 +11006,6 @@
 </p:sld>
 </file>
 
-<file path=ppt/slides/slide22.xml><?xml version="1.0" encoding="utf-8"?>
-<p:sld xmlns:a="http://schemas.openxmlformats.org/drawingml/2006/main" xmlns:r="http://schemas.openxmlformats.org/officeDocument/2006/relationships" xmlns:p="http://schemas.openxmlformats.org/presentationml/2006/main">
-  <p:cSld>
-    <p:spTree>
-      <p:nvGrpSpPr>
-        <p:cNvPr id="1" name=""/>
-        <p:cNvGrpSpPr/>
-        <p:nvPr/>
-      </p:nvGrpSpPr>
-      <p:grpSpPr>
-        <a:xfrm>
-          <a:off x="0" y="0"/>
-          <a:ext cx="0" cy="0"/>
-          <a:chOff x="0" y="0"/>
-          <a:chExt cx="0" cy="0"/>
-        </a:xfrm>
-      </p:grpSpPr>
-      <p:sp>
-        <p:nvSpPr>
-          <p:cNvPr id="2" name="Title 1">
-            <a:extLst>
-              <a:ext uri="{FF2B5EF4-FFF2-40B4-BE49-F238E27FC236}">
-                <a16:creationId xmlns:a16="http://schemas.microsoft.com/office/drawing/2014/main" id="{23503C44-684B-884F-9B9D-A3ED482BC201}"/>
-              </a:ext>
-            </a:extLst>
-          </p:cNvPr>
-          <p:cNvSpPr>
-            <a:spLocks noGrp="1"/>
-          </p:cNvSpPr>
-          <p:nvPr>
-            <p:ph type="title"/>
-          </p:nvPr>
-        </p:nvSpPr>
-        <p:spPr>
-          <a:xfrm>
-            <a:off x="469120" y="2531580"/>
-            <a:ext cx="6707188" cy="863600"/>
-          </a:xfrm>
-        </p:spPr>
-        <p:txBody>
-          <a:bodyPr/>
-          <a:lstStyle/>
-          <a:p>
-            <a:r>
-              <a:rPr lang="de-DE" dirty="0"/>
-              <a:t>Higher </a:t>
-            </a:r>
-            <a:r>
-              <a:rPr lang="de-DE" dirty="0" err="1"/>
-              <a:t>learning</a:t>
-            </a:r>
-            <a:r>
-              <a:rPr lang="de-DE" dirty="0"/>
-              <a:t> rate (x100)</a:t>
-            </a:r>
-          </a:p>
-        </p:txBody>
-      </p:sp>
-      <p:sp>
-        <p:nvSpPr>
-          <p:cNvPr id="5" name="Date Placeholder 4">
-            <a:extLst>
-              <a:ext uri="{FF2B5EF4-FFF2-40B4-BE49-F238E27FC236}">
-                <a16:creationId xmlns:a16="http://schemas.microsoft.com/office/drawing/2014/main" id="{4936C492-F944-E845-AE61-774A067BC983}"/>
-              </a:ext>
-            </a:extLst>
-          </p:cNvPr>
-          <p:cNvSpPr>
-            <a:spLocks noGrp="1"/>
-          </p:cNvSpPr>
-          <p:nvPr>
-            <p:ph type="dt" sz="half" idx="10"/>
-          </p:nvPr>
-        </p:nvSpPr>
-        <p:spPr/>
-        <p:txBody>
-          <a:bodyPr/>
-          <a:lstStyle/>
-          <a:p>
-            <a:r>
-              <a:rPr lang="de-DE"/>
-              <a:t>15. Januar 2020</a:t>
-            </a:r>
-          </a:p>
-        </p:txBody>
-      </p:sp>
-      <p:sp>
-        <p:nvSpPr>
-          <p:cNvPr id="6" name="Footer Placeholder 5">
-            <a:extLst>
-              <a:ext uri="{FF2B5EF4-FFF2-40B4-BE49-F238E27FC236}">
-                <a16:creationId xmlns:a16="http://schemas.microsoft.com/office/drawing/2014/main" id="{B7B536D2-86D4-894D-AF99-254C78515A68}"/>
-              </a:ext>
-            </a:extLst>
-          </p:cNvPr>
-          <p:cNvSpPr>
-            <a:spLocks noGrp="1"/>
-          </p:cNvSpPr>
-          <p:nvPr>
-            <p:ph type="ftr" sz="quarter" idx="11"/>
-          </p:nvPr>
-        </p:nvSpPr>
-        <p:spPr/>
-        <p:txBody>
-          <a:bodyPr/>
-          <a:lstStyle/>
-          <a:p>
-            <a:r>
-              <a:rPr lang="de-DE" b="1"/>
-              <a:t>Deep Reinforcement Learning: TD3</a:t>
-            </a:r>
-            <a:endParaRPr lang="de-DE" b="1" dirty="0"/>
-          </a:p>
-        </p:txBody>
-      </p:sp>
-      <p:sp>
-        <p:nvSpPr>
-          <p:cNvPr id="7" name="Slide Number Placeholder 6">
-            <a:extLst>
-              <a:ext uri="{FF2B5EF4-FFF2-40B4-BE49-F238E27FC236}">
-                <a16:creationId xmlns:a16="http://schemas.microsoft.com/office/drawing/2014/main" id="{540EBBAA-F0F5-464C-B77A-416179AF79A9}"/>
-              </a:ext>
-            </a:extLst>
-          </p:cNvPr>
-          <p:cNvSpPr>
-            <a:spLocks noGrp="1"/>
-          </p:cNvSpPr>
-          <p:nvPr>
-            <p:ph type="sldNum" sz="quarter" idx="12"/>
-          </p:nvPr>
-        </p:nvSpPr>
-        <p:spPr/>
-        <p:txBody>
-          <a:bodyPr/>
-          <a:lstStyle/>
-          <a:p>
-            <a:fld id="{8C8FEA95-401B-4A59-A0C9-740C061053CF}" type="slidenum">
-              <a:rPr lang="de-DE" smtClean="0"/>
-              <a:pPr/>
-              <a:t>22</a:t>
-            </a:fld>
-            <a:endParaRPr lang="de-DE"/>
-          </a:p>
-        </p:txBody>
-      </p:sp>
-    </p:spTree>
-    <p:extLst>
-      <p:ext uri="{BB962C8B-B14F-4D97-AF65-F5344CB8AC3E}">
-        <p14:creationId xmlns:p14="http://schemas.microsoft.com/office/powerpoint/2010/main" val="862373511"/>
-      </p:ext>
-    </p:extLst>
-  </p:cSld>
-  <p:clrMapOvr>
-    <a:masterClrMapping/>
-  </p:clrMapOvr>
-</p:sld>
-</file>
-
 <file path=ppt/slides/slide23.xml><?xml version="1.0" encoding="utf-8"?>
 <p:sld xmlns:a="http://schemas.openxmlformats.org/drawingml/2006/main" xmlns:r="http://schemas.openxmlformats.org/officeDocument/2006/relationships" xmlns:p="http://schemas.openxmlformats.org/presentationml/2006/main">
   <p:cSld>
@@ -10590,6 +11028,164 @@
           <p:cNvPr id="2" name="Title 1">
             <a:extLst>
               <a:ext uri="{FF2B5EF4-FFF2-40B4-BE49-F238E27FC236}">
+                <a16:creationId xmlns:a16="http://schemas.microsoft.com/office/drawing/2014/main" id="{23503C44-684B-884F-9B9D-A3ED482BC201}"/>
+              </a:ext>
+            </a:extLst>
+          </p:cNvPr>
+          <p:cNvSpPr>
+            <a:spLocks noGrp="1"/>
+          </p:cNvSpPr>
+          <p:nvPr>
+            <p:ph type="title"/>
+          </p:nvPr>
+        </p:nvSpPr>
+        <p:spPr>
+          <a:xfrm>
+            <a:off x="469120" y="2531580"/>
+            <a:ext cx="6707188" cy="863600"/>
+          </a:xfrm>
+        </p:spPr>
+        <p:txBody>
+          <a:bodyPr/>
+          <a:lstStyle/>
+          <a:p>
+            <a:r>
+              <a:rPr lang="de-DE" dirty="0"/>
+              <a:t>Higher </a:t>
+            </a:r>
+            <a:r>
+              <a:rPr lang="de-DE" dirty="0" err="1"/>
+              <a:t>learning</a:t>
+            </a:r>
+            <a:r>
+              <a:rPr lang="de-DE" dirty="0"/>
+              <a:t> rate (x100)</a:t>
+            </a:r>
+          </a:p>
+        </p:txBody>
+      </p:sp>
+      <p:sp>
+        <p:nvSpPr>
+          <p:cNvPr id="5" name="Date Placeholder 4">
+            <a:extLst>
+              <a:ext uri="{FF2B5EF4-FFF2-40B4-BE49-F238E27FC236}">
+                <a16:creationId xmlns:a16="http://schemas.microsoft.com/office/drawing/2014/main" id="{4936C492-F944-E845-AE61-774A067BC983}"/>
+              </a:ext>
+            </a:extLst>
+          </p:cNvPr>
+          <p:cNvSpPr>
+            <a:spLocks noGrp="1"/>
+          </p:cNvSpPr>
+          <p:nvPr>
+            <p:ph type="dt" sz="half" idx="10"/>
+          </p:nvPr>
+        </p:nvSpPr>
+        <p:spPr/>
+        <p:txBody>
+          <a:bodyPr/>
+          <a:lstStyle/>
+          <a:p>
+            <a:r>
+              <a:rPr lang="de-DE"/>
+              <a:t>15. Januar 2020</a:t>
+            </a:r>
+          </a:p>
+        </p:txBody>
+      </p:sp>
+      <p:sp>
+        <p:nvSpPr>
+          <p:cNvPr id="6" name="Footer Placeholder 5">
+            <a:extLst>
+              <a:ext uri="{FF2B5EF4-FFF2-40B4-BE49-F238E27FC236}">
+                <a16:creationId xmlns:a16="http://schemas.microsoft.com/office/drawing/2014/main" id="{B7B536D2-86D4-894D-AF99-254C78515A68}"/>
+              </a:ext>
+            </a:extLst>
+          </p:cNvPr>
+          <p:cNvSpPr>
+            <a:spLocks noGrp="1"/>
+          </p:cNvSpPr>
+          <p:nvPr>
+            <p:ph type="ftr" sz="quarter" idx="11"/>
+          </p:nvPr>
+        </p:nvSpPr>
+        <p:spPr/>
+        <p:txBody>
+          <a:bodyPr/>
+          <a:lstStyle/>
+          <a:p>
+            <a:r>
+              <a:rPr lang="de-DE" b="1"/>
+              <a:t>Deep Reinforcement Learning: TD3</a:t>
+            </a:r>
+            <a:endParaRPr lang="de-DE" b="1" dirty="0"/>
+          </a:p>
+        </p:txBody>
+      </p:sp>
+      <p:sp>
+        <p:nvSpPr>
+          <p:cNvPr id="7" name="Slide Number Placeholder 6">
+            <a:extLst>
+              <a:ext uri="{FF2B5EF4-FFF2-40B4-BE49-F238E27FC236}">
+                <a16:creationId xmlns:a16="http://schemas.microsoft.com/office/drawing/2014/main" id="{540EBBAA-F0F5-464C-B77A-416179AF79A9}"/>
+              </a:ext>
+            </a:extLst>
+          </p:cNvPr>
+          <p:cNvSpPr>
+            <a:spLocks noGrp="1"/>
+          </p:cNvSpPr>
+          <p:nvPr>
+            <p:ph type="sldNum" sz="quarter" idx="12"/>
+          </p:nvPr>
+        </p:nvSpPr>
+        <p:spPr/>
+        <p:txBody>
+          <a:bodyPr/>
+          <a:lstStyle/>
+          <a:p>
+            <a:fld id="{8C8FEA95-401B-4A59-A0C9-740C061053CF}" type="slidenum">
+              <a:rPr lang="de-DE" smtClean="0"/>
+              <a:pPr/>
+              <a:t>23</a:t>
+            </a:fld>
+            <a:endParaRPr lang="de-DE"/>
+          </a:p>
+        </p:txBody>
+      </p:sp>
+    </p:spTree>
+    <p:extLst>
+      <p:ext uri="{BB962C8B-B14F-4D97-AF65-F5344CB8AC3E}">
+        <p14:creationId xmlns:p14="http://schemas.microsoft.com/office/powerpoint/2010/main" val="862373511"/>
+      </p:ext>
+    </p:extLst>
+  </p:cSld>
+  <p:clrMapOvr>
+    <a:masterClrMapping/>
+  </p:clrMapOvr>
+</p:sld>
+</file>
+
+<file path=ppt/slides/slide24.xml><?xml version="1.0" encoding="utf-8"?>
+<p:sld xmlns:a="http://schemas.openxmlformats.org/drawingml/2006/main" xmlns:r="http://schemas.openxmlformats.org/officeDocument/2006/relationships" xmlns:p="http://schemas.openxmlformats.org/presentationml/2006/main">
+  <p:cSld>
+    <p:spTree>
+      <p:nvGrpSpPr>
+        <p:cNvPr id="1" name=""/>
+        <p:cNvGrpSpPr/>
+        <p:nvPr/>
+      </p:nvGrpSpPr>
+      <p:grpSpPr>
+        <a:xfrm>
+          <a:off x="0" y="0"/>
+          <a:ext cx="0" cy="0"/>
+          <a:chOff x="0" y="0"/>
+          <a:chExt cx="0" cy="0"/>
+        </a:xfrm>
+      </p:grpSpPr>
+      <p:sp>
+        <p:nvSpPr>
+          <p:cNvPr id="2" name="Title 1">
+            <a:extLst>
+              <a:ext uri="{FF2B5EF4-FFF2-40B4-BE49-F238E27FC236}">
                 <a16:creationId xmlns:a16="http://schemas.microsoft.com/office/drawing/2014/main" id="{13EDCF36-2B3D-7B4B-B557-639994418F60}"/>
               </a:ext>
             </a:extLst>
@@ -10735,7 +11331,7 @@
             <a:fld id="{8C8FEA95-401B-4A59-A0C9-740C061053CF}" type="slidenum">
               <a:rPr lang="de-DE" smtClean="0"/>
               <a:pPr/>
-              <a:t>23</a:t>
+              <a:t>24</a:t>
             </a:fld>
             <a:endParaRPr lang="de-DE"/>
           </a:p>
@@ -10790,7 +11386,7 @@
 </p:sld>
 </file>
 
-<file path=ppt/slides/slide24.xml><?xml version="1.0" encoding="utf-8"?>
+<file path=ppt/slides/slide25.xml><?xml version="1.0" encoding="utf-8"?>
 <p:sld xmlns:a="http://schemas.openxmlformats.org/drawingml/2006/main" xmlns:r="http://schemas.openxmlformats.org/officeDocument/2006/relationships" xmlns:p="http://schemas.openxmlformats.org/presentationml/2006/main">
   <p:cSld>
     <p:spTree>
@@ -10924,7 +11520,7 @@
             <a:fld id="{8C8FEA95-401B-4A59-A0C9-740C061053CF}" type="slidenum">
               <a:rPr lang="de-DE" smtClean="0"/>
               <a:pPr/>
-              <a:t>24</a:t>
+              <a:t>25</a:t>
             </a:fld>
             <a:endParaRPr lang="de-DE"/>
           </a:p>
@@ -11114,164 +11710,6 @@
 </p:sld>
 </file>
 
-<file path=ppt/slides/slide25.xml><?xml version="1.0" encoding="utf-8"?>
-<p:sld xmlns:a="http://schemas.openxmlformats.org/drawingml/2006/main" xmlns:r="http://schemas.openxmlformats.org/officeDocument/2006/relationships" xmlns:p="http://schemas.openxmlformats.org/presentationml/2006/main">
-  <p:cSld>
-    <p:spTree>
-      <p:nvGrpSpPr>
-        <p:cNvPr id="1" name=""/>
-        <p:cNvGrpSpPr/>
-        <p:nvPr/>
-      </p:nvGrpSpPr>
-      <p:grpSpPr>
-        <a:xfrm>
-          <a:off x="0" y="0"/>
-          <a:ext cx="0" cy="0"/>
-          <a:chOff x="0" y="0"/>
-          <a:chExt cx="0" cy="0"/>
-        </a:xfrm>
-      </p:grpSpPr>
-      <p:sp>
-        <p:nvSpPr>
-          <p:cNvPr id="2" name="Title 1">
-            <a:extLst>
-              <a:ext uri="{FF2B5EF4-FFF2-40B4-BE49-F238E27FC236}">
-                <a16:creationId xmlns:a16="http://schemas.microsoft.com/office/drawing/2014/main" id="{23503C44-684B-884F-9B9D-A3ED482BC201}"/>
-              </a:ext>
-            </a:extLst>
-          </p:cNvPr>
-          <p:cNvSpPr>
-            <a:spLocks noGrp="1"/>
-          </p:cNvSpPr>
-          <p:nvPr>
-            <p:ph type="title"/>
-          </p:nvPr>
-        </p:nvSpPr>
-        <p:spPr>
-          <a:xfrm>
-            <a:off x="469120" y="2531580"/>
-            <a:ext cx="6707188" cy="863600"/>
-          </a:xfrm>
-        </p:spPr>
-        <p:txBody>
-          <a:bodyPr/>
-          <a:lstStyle/>
-          <a:p>
-            <a:r>
-              <a:rPr lang="de-DE" dirty="0"/>
-              <a:t>Higher </a:t>
-            </a:r>
-            <a:r>
-              <a:rPr lang="de-DE" dirty="0" err="1"/>
-              <a:t>learning</a:t>
-            </a:r>
-            <a:r>
-              <a:rPr lang="de-DE" dirty="0"/>
-              <a:t> rate (x1000)</a:t>
-            </a:r>
-          </a:p>
-        </p:txBody>
-      </p:sp>
-      <p:sp>
-        <p:nvSpPr>
-          <p:cNvPr id="5" name="Date Placeholder 4">
-            <a:extLst>
-              <a:ext uri="{FF2B5EF4-FFF2-40B4-BE49-F238E27FC236}">
-                <a16:creationId xmlns:a16="http://schemas.microsoft.com/office/drawing/2014/main" id="{4936C492-F944-E845-AE61-774A067BC983}"/>
-              </a:ext>
-            </a:extLst>
-          </p:cNvPr>
-          <p:cNvSpPr>
-            <a:spLocks noGrp="1"/>
-          </p:cNvSpPr>
-          <p:nvPr>
-            <p:ph type="dt" sz="half" idx="10"/>
-          </p:nvPr>
-        </p:nvSpPr>
-        <p:spPr/>
-        <p:txBody>
-          <a:bodyPr/>
-          <a:lstStyle/>
-          <a:p>
-            <a:r>
-              <a:rPr lang="de-DE"/>
-              <a:t>15. Januar 2020</a:t>
-            </a:r>
-          </a:p>
-        </p:txBody>
-      </p:sp>
-      <p:sp>
-        <p:nvSpPr>
-          <p:cNvPr id="6" name="Footer Placeholder 5">
-            <a:extLst>
-              <a:ext uri="{FF2B5EF4-FFF2-40B4-BE49-F238E27FC236}">
-                <a16:creationId xmlns:a16="http://schemas.microsoft.com/office/drawing/2014/main" id="{B7B536D2-86D4-894D-AF99-254C78515A68}"/>
-              </a:ext>
-            </a:extLst>
-          </p:cNvPr>
-          <p:cNvSpPr>
-            <a:spLocks noGrp="1"/>
-          </p:cNvSpPr>
-          <p:nvPr>
-            <p:ph type="ftr" sz="quarter" idx="11"/>
-          </p:nvPr>
-        </p:nvSpPr>
-        <p:spPr/>
-        <p:txBody>
-          <a:bodyPr/>
-          <a:lstStyle/>
-          <a:p>
-            <a:r>
-              <a:rPr lang="de-DE" b="1"/>
-              <a:t>Deep Reinforcement Learning: TD3</a:t>
-            </a:r>
-            <a:endParaRPr lang="de-DE" b="1" dirty="0"/>
-          </a:p>
-        </p:txBody>
-      </p:sp>
-      <p:sp>
-        <p:nvSpPr>
-          <p:cNvPr id="7" name="Slide Number Placeholder 6">
-            <a:extLst>
-              <a:ext uri="{FF2B5EF4-FFF2-40B4-BE49-F238E27FC236}">
-                <a16:creationId xmlns:a16="http://schemas.microsoft.com/office/drawing/2014/main" id="{540EBBAA-F0F5-464C-B77A-416179AF79A9}"/>
-              </a:ext>
-            </a:extLst>
-          </p:cNvPr>
-          <p:cNvSpPr>
-            <a:spLocks noGrp="1"/>
-          </p:cNvSpPr>
-          <p:nvPr>
-            <p:ph type="sldNum" sz="quarter" idx="12"/>
-          </p:nvPr>
-        </p:nvSpPr>
-        <p:spPr/>
-        <p:txBody>
-          <a:bodyPr/>
-          <a:lstStyle/>
-          <a:p>
-            <a:fld id="{8C8FEA95-401B-4A59-A0C9-740C061053CF}" type="slidenum">
-              <a:rPr lang="de-DE" smtClean="0"/>
-              <a:pPr/>
-              <a:t>25</a:t>
-            </a:fld>
-            <a:endParaRPr lang="de-DE"/>
-          </a:p>
-        </p:txBody>
-      </p:sp>
-    </p:spTree>
-    <p:extLst>
-      <p:ext uri="{BB962C8B-B14F-4D97-AF65-F5344CB8AC3E}">
-        <p14:creationId xmlns:p14="http://schemas.microsoft.com/office/powerpoint/2010/main" val="134040426"/>
-      </p:ext>
-    </p:extLst>
-  </p:cSld>
-  <p:clrMapOvr>
-    <a:masterClrMapping/>
-  </p:clrMapOvr>
-</p:sld>
-</file>
-
 <file path=ppt/slides/slide26.xml><?xml version="1.0" encoding="utf-8"?>
 <p:sld xmlns:a="http://schemas.openxmlformats.org/drawingml/2006/main" xmlns:r="http://schemas.openxmlformats.org/officeDocument/2006/relationships" xmlns:p="http://schemas.openxmlformats.org/presentationml/2006/main">
   <p:cSld>
@@ -11294,6 +11732,164 @@
           <p:cNvPr id="2" name="Title 1">
             <a:extLst>
               <a:ext uri="{FF2B5EF4-FFF2-40B4-BE49-F238E27FC236}">
+                <a16:creationId xmlns:a16="http://schemas.microsoft.com/office/drawing/2014/main" id="{23503C44-684B-884F-9B9D-A3ED482BC201}"/>
+              </a:ext>
+            </a:extLst>
+          </p:cNvPr>
+          <p:cNvSpPr>
+            <a:spLocks noGrp="1"/>
+          </p:cNvSpPr>
+          <p:nvPr>
+            <p:ph type="title"/>
+          </p:nvPr>
+        </p:nvSpPr>
+        <p:spPr>
+          <a:xfrm>
+            <a:off x="469120" y="2531580"/>
+            <a:ext cx="6707188" cy="863600"/>
+          </a:xfrm>
+        </p:spPr>
+        <p:txBody>
+          <a:bodyPr/>
+          <a:lstStyle/>
+          <a:p>
+            <a:r>
+              <a:rPr lang="de-DE" dirty="0"/>
+              <a:t>Higher </a:t>
+            </a:r>
+            <a:r>
+              <a:rPr lang="de-DE" dirty="0" err="1"/>
+              <a:t>learning</a:t>
+            </a:r>
+            <a:r>
+              <a:rPr lang="de-DE" dirty="0"/>
+              <a:t> rate (x1000)</a:t>
+            </a:r>
+          </a:p>
+        </p:txBody>
+      </p:sp>
+      <p:sp>
+        <p:nvSpPr>
+          <p:cNvPr id="5" name="Date Placeholder 4">
+            <a:extLst>
+              <a:ext uri="{FF2B5EF4-FFF2-40B4-BE49-F238E27FC236}">
+                <a16:creationId xmlns:a16="http://schemas.microsoft.com/office/drawing/2014/main" id="{4936C492-F944-E845-AE61-774A067BC983}"/>
+              </a:ext>
+            </a:extLst>
+          </p:cNvPr>
+          <p:cNvSpPr>
+            <a:spLocks noGrp="1"/>
+          </p:cNvSpPr>
+          <p:nvPr>
+            <p:ph type="dt" sz="half" idx="10"/>
+          </p:nvPr>
+        </p:nvSpPr>
+        <p:spPr/>
+        <p:txBody>
+          <a:bodyPr/>
+          <a:lstStyle/>
+          <a:p>
+            <a:r>
+              <a:rPr lang="de-DE"/>
+              <a:t>15. Januar 2020</a:t>
+            </a:r>
+          </a:p>
+        </p:txBody>
+      </p:sp>
+      <p:sp>
+        <p:nvSpPr>
+          <p:cNvPr id="6" name="Footer Placeholder 5">
+            <a:extLst>
+              <a:ext uri="{FF2B5EF4-FFF2-40B4-BE49-F238E27FC236}">
+                <a16:creationId xmlns:a16="http://schemas.microsoft.com/office/drawing/2014/main" id="{B7B536D2-86D4-894D-AF99-254C78515A68}"/>
+              </a:ext>
+            </a:extLst>
+          </p:cNvPr>
+          <p:cNvSpPr>
+            <a:spLocks noGrp="1"/>
+          </p:cNvSpPr>
+          <p:nvPr>
+            <p:ph type="ftr" sz="quarter" idx="11"/>
+          </p:nvPr>
+        </p:nvSpPr>
+        <p:spPr/>
+        <p:txBody>
+          <a:bodyPr/>
+          <a:lstStyle/>
+          <a:p>
+            <a:r>
+              <a:rPr lang="de-DE" b="1"/>
+              <a:t>Deep Reinforcement Learning: TD3</a:t>
+            </a:r>
+            <a:endParaRPr lang="de-DE" b="1" dirty="0"/>
+          </a:p>
+        </p:txBody>
+      </p:sp>
+      <p:sp>
+        <p:nvSpPr>
+          <p:cNvPr id="7" name="Slide Number Placeholder 6">
+            <a:extLst>
+              <a:ext uri="{FF2B5EF4-FFF2-40B4-BE49-F238E27FC236}">
+                <a16:creationId xmlns:a16="http://schemas.microsoft.com/office/drawing/2014/main" id="{540EBBAA-F0F5-464C-B77A-416179AF79A9}"/>
+              </a:ext>
+            </a:extLst>
+          </p:cNvPr>
+          <p:cNvSpPr>
+            <a:spLocks noGrp="1"/>
+          </p:cNvSpPr>
+          <p:nvPr>
+            <p:ph type="sldNum" sz="quarter" idx="12"/>
+          </p:nvPr>
+        </p:nvSpPr>
+        <p:spPr/>
+        <p:txBody>
+          <a:bodyPr/>
+          <a:lstStyle/>
+          <a:p>
+            <a:fld id="{8C8FEA95-401B-4A59-A0C9-740C061053CF}" type="slidenum">
+              <a:rPr lang="de-DE" smtClean="0"/>
+              <a:pPr/>
+              <a:t>26</a:t>
+            </a:fld>
+            <a:endParaRPr lang="de-DE"/>
+          </a:p>
+        </p:txBody>
+      </p:sp>
+    </p:spTree>
+    <p:extLst>
+      <p:ext uri="{BB962C8B-B14F-4D97-AF65-F5344CB8AC3E}">
+        <p14:creationId xmlns:p14="http://schemas.microsoft.com/office/powerpoint/2010/main" val="134040426"/>
+      </p:ext>
+    </p:extLst>
+  </p:cSld>
+  <p:clrMapOvr>
+    <a:masterClrMapping/>
+  </p:clrMapOvr>
+</p:sld>
+</file>
+
+<file path=ppt/slides/slide27.xml><?xml version="1.0" encoding="utf-8"?>
+<p:sld xmlns:a="http://schemas.openxmlformats.org/drawingml/2006/main" xmlns:r="http://schemas.openxmlformats.org/officeDocument/2006/relationships" xmlns:p="http://schemas.openxmlformats.org/presentationml/2006/main">
+  <p:cSld>
+    <p:spTree>
+      <p:nvGrpSpPr>
+        <p:cNvPr id="1" name=""/>
+        <p:cNvGrpSpPr/>
+        <p:nvPr/>
+      </p:nvGrpSpPr>
+      <p:grpSpPr>
+        <a:xfrm>
+          <a:off x="0" y="0"/>
+          <a:ext cx="0" cy="0"/>
+          <a:chOff x="0" y="0"/>
+          <a:chExt cx="0" cy="0"/>
+        </a:xfrm>
+      </p:grpSpPr>
+      <p:sp>
+        <p:nvSpPr>
+          <p:cNvPr id="2" name="Title 1">
+            <a:extLst>
+              <a:ext uri="{FF2B5EF4-FFF2-40B4-BE49-F238E27FC236}">
                 <a16:creationId xmlns:a16="http://schemas.microsoft.com/office/drawing/2014/main" id="{13EDCF36-2B3D-7B4B-B557-639994418F60}"/>
               </a:ext>
             </a:extLst>
@@ -11439,7 +12035,7 @@
             <a:fld id="{8C8FEA95-401B-4A59-A0C9-740C061053CF}" type="slidenum">
               <a:rPr lang="de-DE" smtClean="0"/>
               <a:pPr/>
-              <a:t>26</a:t>
+              <a:t>27</a:t>
             </a:fld>
             <a:endParaRPr lang="de-DE"/>
           </a:p>
@@ -11540,7 +12136,7 @@
 </p:sld>
 </file>
 
-<file path=ppt/slides/slide27.xml><?xml version="1.0" encoding="utf-8"?>
+<file path=ppt/slides/slide28.xml><?xml version="1.0" encoding="utf-8"?>
 <p:sld xmlns:a="http://schemas.openxmlformats.org/drawingml/2006/main" xmlns:r="http://schemas.openxmlformats.org/officeDocument/2006/relationships" xmlns:p="http://schemas.openxmlformats.org/presentationml/2006/main">
   <p:cSld>
     <p:spTree>
@@ -11666,7 +12262,7 @@
             <a:fld id="{8C8FEA95-401B-4A59-A0C9-740C061053CF}" type="slidenum">
               <a:rPr lang="de-DE" smtClean="0"/>
               <a:pPr/>
-              <a:t>27</a:t>
+              <a:t>28</a:t>
             </a:fld>
             <a:endParaRPr lang="de-DE"/>
           </a:p>
@@ -11856,238 +12452,6 @@
 </p:sld>
 </file>
 
-<file path=ppt/slides/slide28.xml><?xml version="1.0" encoding="utf-8"?>
-<p:sld xmlns:a="http://schemas.openxmlformats.org/drawingml/2006/main" xmlns:r="http://schemas.openxmlformats.org/officeDocument/2006/relationships" xmlns:p="http://schemas.openxmlformats.org/presentationml/2006/main">
-  <p:cSld>
-    <p:spTree>
-      <p:nvGrpSpPr>
-        <p:cNvPr id="1" name=""/>
-        <p:cNvGrpSpPr/>
-        <p:nvPr/>
-      </p:nvGrpSpPr>
-      <p:grpSpPr>
-        <a:xfrm>
-          <a:off x="0" y="0"/>
-          <a:ext cx="0" cy="0"/>
-          <a:chOff x="0" y="0"/>
-          <a:chExt cx="0" cy="0"/>
-        </a:xfrm>
-      </p:grpSpPr>
-      <p:sp>
-        <p:nvSpPr>
-          <p:cNvPr id="2" name="Title 1">
-            <a:extLst>
-              <a:ext uri="{FF2B5EF4-FFF2-40B4-BE49-F238E27FC236}">
-                <a16:creationId xmlns:a16="http://schemas.microsoft.com/office/drawing/2014/main" id="{13EDCF36-2B3D-7B4B-B557-639994418F60}"/>
-              </a:ext>
-            </a:extLst>
-          </p:cNvPr>
-          <p:cNvSpPr>
-            <a:spLocks noGrp="1"/>
-          </p:cNvSpPr>
-          <p:nvPr>
-            <p:ph type="title"/>
-          </p:nvPr>
-        </p:nvSpPr>
-        <p:spPr/>
-        <p:txBody>
-          <a:bodyPr/>
-          <a:lstStyle/>
-          <a:p>
-            <a:r>
-              <a:rPr lang="de-DE" dirty="0"/>
-              <a:t>Experiment: Walking </a:t>
-            </a:r>
-            <a:r>
-              <a:rPr lang="de-DE" dirty="0" err="1"/>
-              <a:t>Ant</a:t>
-            </a:r>
-            <a:endParaRPr lang="de-DE" dirty="0"/>
-          </a:p>
-        </p:txBody>
-      </p:sp>
-      <p:sp>
-        <p:nvSpPr>
-          <p:cNvPr id="3" name="Content Placeholder 2">
-            <a:extLst>
-              <a:ext uri="{FF2B5EF4-FFF2-40B4-BE49-F238E27FC236}">
-                <a16:creationId xmlns:a16="http://schemas.microsoft.com/office/drawing/2014/main" id="{F0E96634-3C1A-C840-A6FC-3030247742F3}"/>
-              </a:ext>
-            </a:extLst>
-          </p:cNvPr>
-          <p:cNvSpPr>
-            <a:spLocks noGrp="1"/>
-          </p:cNvSpPr>
-          <p:nvPr>
-            <p:ph sz="half" idx="1"/>
-          </p:nvPr>
-        </p:nvSpPr>
-        <p:spPr>
-          <a:xfrm>
-            <a:off x="457200" y="1701006"/>
-            <a:ext cx="8183563" cy="4319587"/>
-          </a:xfrm>
-        </p:spPr>
-        <p:txBody>
-          <a:bodyPr/>
-          <a:lstStyle/>
-          <a:p>
-            <a:r>
-              <a:rPr lang="de-DE" dirty="0"/>
-              <a:t>Walking </a:t>
-            </a:r>
-            <a:r>
-              <a:rPr lang="de-DE" dirty="0" err="1"/>
-              <a:t>Ant</a:t>
-            </a:r>
-            <a:endParaRPr lang="de-DE" dirty="0"/>
-          </a:p>
-          <a:p>
-            <a:r>
-              <a:rPr lang="de-DE" dirty="0"/>
-              <a:t>Default Settings </a:t>
-            </a:r>
-            <a:r>
-              <a:rPr lang="de-DE" dirty="0" err="1"/>
-              <a:t>with</a:t>
-            </a:r>
-            <a:r>
-              <a:rPr lang="de-DE" dirty="0"/>
-              <a:t> a </a:t>
-            </a:r>
-            <a:r>
-              <a:rPr lang="de-DE" dirty="0" err="1"/>
-              <a:t>little</a:t>
-            </a:r>
-            <a:r>
-              <a:rPr lang="de-DE" dirty="0"/>
-              <a:t> </a:t>
-            </a:r>
-            <a:r>
-              <a:rPr lang="de-DE" dirty="0" err="1"/>
-              <a:t>more</a:t>
-            </a:r>
-            <a:r>
-              <a:rPr lang="de-DE" dirty="0"/>
-              <a:t> </a:t>
-            </a:r>
-            <a:r>
-              <a:rPr lang="de-DE" dirty="0" err="1"/>
-              <a:t>noise</a:t>
-            </a:r>
-            <a:r>
-              <a:rPr lang="de-DE" dirty="0"/>
-              <a:t> </a:t>
-            </a:r>
-          </a:p>
-          <a:p>
-            <a:endParaRPr lang="de-DE" dirty="0"/>
-          </a:p>
-          <a:p>
-            <a:endParaRPr lang="de-DE" dirty="0"/>
-          </a:p>
-        </p:txBody>
-      </p:sp>
-      <p:sp>
-        <p:nvSpPr>
-          <p:cNvPr id="5" name="Date Placeholder 4">
-            <a:extLst>
-              <a:ext uri="{FF2B5EF4-FFF2-40B4-BE49-F238E27FC236}">
-                <a16:creationId xmlns:a16="http://schemas.microsoft.com/office/drawing/2014/main" id="{B8C4BF55-1F43-3241-A7CB-978F0646D2DB}"/>
-              </a:ext>
-            </a:extLst>
-          </p:cNvPr>
-          <p:cNvSpPr>
-            <a:spLocks noGrp="1"/>
-          </p:cNvSpPr>
-          <p:nvPr>
-            <p:ph type="dt" sz="half" idx="10"/>
-          </p:nvPr>
-        </p:nvSpPr>
-        <p:spPr/>
-        <p:txBody>
-          <a:bodyPr/>
-          <a:lstStyle/>
-          <a:p>
-            <a:r>
-              <a:rPr lang="de-DE"/>
-              <a:t>15. Januar 2020</a:t>
-            </a:r>
-          </a:p>
-        </p:txBody>
-      </p:sp>
-      <p:sp>
-        <p:nvSpPr>
-          <p:cNvPr id="6" name="Footer Placeholder 5">
-            <a:extLst>
-              <a:ext uri="{FF2B5EF4-FFF2-40B4-BE49-F238E27FC236}">
-                <a16:creationId xmlns:a16="http://schemas.microsoft.com/office/drawing/2014/main" id="{D56D663D-B635-7F42-AF93-FE8D53ECDC00}"/>
-              </a:ext>
-            </a:extLst>
-          </p:cNvPr>
-          <p:cNvSpPr>
-            <a:spLocks noGrp="1"/>
-          </p:cNvSpPr>
-          <p:nvPr>
-            <p:ph type="ftr" sz="quarter" idx="11"/>
-          </p:nvPr>
-        </p:nvSpPr>
-        <p:spPr/>
-        <p:txBody>
-          <a:bodyPr/>
-          <a:lstStyle/>
-          <a:p>
-            <a:r>
-              <a:rPr lang="de-DE" b="1"/>
-              <a:t>Deep Reinforcement Learning: TD3</a:t>
-            </a:r>
-            <a:endParaRPr lang="de-DE" b="1" dirty="0"/>
-          </a:p>
-        </p:txBody>
-      </p:sp>
-      <p:sp>
-        <p:nvSpPr>
-          <p:cNvPr id="7" name="Slide Number Placeholder 6">
-            <a:extLst>
-              <a:ext uri="{FF2B5EF4-FFF2-40B4-BE49-F238E27FC236}">
-                <a16:creationId xmlns:a16="http://schemas.microsoft.com/office/drawing/2014/main" id="{F6676F9D-2383-3743-A4D8-2110743074EF}"/>
-              </a:ext>
-            </a:extLst>
-          </p:cNvPr>
-          <p:cNvSpPr>
-            <a:spLocks noGrp="1"/>
-          </p:cNvSpPr>
-          <p:nvPr>
-            <p:ph type="sldNum" sz="quarter" idx="12"/>
-          </p:nvPr>
-        </p:nvSpPr>
-        <p:spPr/>
-        <p:txBody>
-          <a:bodyPr/>
-          <a:lstStyle/>
-          <a:p>
-            <a:fld id="{8C8FEA95-401B-4A59-A0C9-740C061053CF}" type="slidenum">
-              <a:rPr lang="de-DE" smtClean="0"/>
-              <a:pPr/>
-              <a:t>28</a:t>
-            </a:fld>
-            <a:endParaRPr lang="de-DE"/>
-          </a:p>
-        </p:txBody>
-      </p:sp>
-    </p:spTree>
-    <p:extLst>
-      <p:ext uri="{BB962C8B-B14F-4D97-AF65-F5344CB8AC3E}">
-        <p14:creationId xmlns:p14="http://schemas.microsoft.com/office/powerpoint/2010/main" val="813849237"/>
-      </p:ext>
-    </p:extLst>
-  </p:cSld>
-  <p:clrMapOvr>
-    <a:masterClrMapping/>
-  </p:clrMapOvr>
-</p:sld>
-</file>
-
 <file path=ppt/slides/slide29.xml><?xml version="1.0" encoding="utf-8"?>
 <p:sld xmlns:a="http://schemas.openxmlformats.org/drawingml/2006/main" xmlns:r="http://schemas.openxmlformats.org/officeDocument/2006/relationships" xmlns:p="http://schemas.openxmlformats.org/presentationml/2006/main">
   <p:cSld>
@@ -12164,6 +12528,55 @@
           <a:bodyPr/>
           <a:lstStyle/>
           <a:p>
+            <a:r>
+              <a:rPr lang="de-DE" dirty="0"/>
+              <a:t>Walking </a:t>
+            </a:r>
+            <a:r>
+              <a:rPr lang="de-DE" dirty="0" err="1"/>
+              <a:t>Ant</a:t>
+            </a:r>
+            <a:endParaRPr lang="de-DE" dirty="0"/>
+          </a:p>
+          <a:p>
+            <a:r>
+              <a:rPr lang="de-DE" dirty="0"/>
+              <a:t>Default Settings </a:t>
+            </a:r>
+            <a:r>
+              <a:rPr lang="de-DE" dirty="0" err="1"/>
+              <a:t>with</a:t>
+            </a:r>
+            <a:r>
+              <a:rPr lang="de-DE" dirty="0"/>
+              <a:t> a </a:t>
+            </a:r>
+            <a:r>
+              <a:rPr lang="de-DE" dirty="0" err="1"/>
+              <a:t>little</a:t>
+            </a:r>
+            <a:r>
+              <a:rPr lang="de-DE" dirty="0"/>
+              <a:t> </a:t>
+            </a:r>
+            <a:r>
+              <a:rPr lang="de-DE" dirty="0" err="1"/>
+              <a:t>more</a:t>
+            </a:r>
+            <a:r>
+              <a:rPr lang="de-DE" dirty="0"/>
+              <a:t> </a:t>
+            </a:r>
+            <a:r>
+              <a:rPr lang="de-DE" dirty="0" err="1"/>
+              <a:t>noise</a:t>
+            </a:r>
+            <a:r>
+              <a:rPr lang="de-DE" dirty="0"/>
+              <a:t> </a:t>
+            </a:r>
+          </a:p>
+          <a:p>
             <a:endParaRPr lang="de-DE" dirty="0"/>
           </a:p>
           <a:p>
@@ -12258,92 +12671,10 @@
           </a:p>
         </p:txBody>
       </p:sp>
-      <p:pic>
-        <p:nvPicPr>
-          <p:cNvPr id="8" name="Picture 7" descr="A close up of a map&#10;&#10;Description automatically generated">
-            <a:extLst>
-              <a:ext uri="{FF2B5EF4-FFF2-40B4-BE49-F238E27FC236}">
-                <a16:creationId xmlns:a16="http://schemas.microsoft.com/office/drawing/2014/main" id="{B82E48DA-FECA-2F4B-BFC3-3E9BFD50A30F}"/>
-              </a:ext>
-            </a:extLst>
-          </p:cNvPr>
-          <p:cNvPicPr>
-            <a:picLocks noChangeAspect="1"/>
-          </p:cNvPicPr>
-          <p:nvPr/>
-        </p:nvPicPr>
-        <p:blipFill>
-          <a:blip r:embed="rId3">
-            <a:extLst>
-              <a:ext uri="{28A0092B-C50C-407E-A947-70E740481C1C}">
-                <a14:useLocalDpi xmlns:a14="http://schemas.microsoft.com/office/drawing/2010/main" val="0"/>
-              </a:ext>
-            </a:extLst>
-          </a:blip>
-          <a:stretch>
-            <a:fillRect/>
-          </a:stretch>
-        </p:blipFill>
-        <p:spPr>
-          <a:xfrm>
-            <a:off x="243681" y="2374899"/>
-            <a:ext cx="8610600" cy="2971800"/>
-          </a:xfrm>
-          <a:prstGeom prst="rect">
-            <a:avLst/>
-          </a:prstGeom>
-        </p:spPr>
-      </p:pic>
-      <p:sp>
-        <p:nvSpPr>
-          <p:cNvPr id="16" name="Down Arrow 15">
-            <a:extLst>
-              <a:ext uri="{FF2B5EF4-FFF2-40B4-BE49-F238E27FC236}">
-                <a16:creationId xmlns:a16="http://schemas.microsoft.com/office/drawing/2014/main" id="{354721A3-6684-9848-BFDC-896CF231C49D}"/>
-              </a:ext>
-            </a:extLst>
-          </p:cNvPr>
-          <p:cNvSpPr/>
-          <p:nvPr/>
-        </p:nvSpPr>
-        <p:spPr>
-          <a:xfrm rot="1274093">
-            <a:off x="721659" y="2389909"/>
-            <a:ext cx="360040" cy="1008112"/>
-          </a:xfrm>
-          <a:prstGeom prst="downArrow">
-            <a:avLst/>
-          </a:prstGeom>
-        </p:spPr>
-        <p:style>
-          <a:lnRef idx="2">
-            <a:schemeClr val="accent1">
-              <a:shade val="50000"/>
-            </a:schemeClr>
-          </a:lnRef>
-          <a:fillRef idx="1">
-            <a:schemeClr val="accent1"/>
-          </a:fillRef>
-          <a:effectRef idx="0">
-            <a:schemeClr val="accent1"/>
-          </a:effectRef>
-          <a:fontRef idx="minor">
-            <a:schemeClr val="lt1"/>
-          </a:fontRef>
-        </p:style>
-        <p:txBody>
-          <a:bodyPr rtlCol="0" anchor="ctr"/>
-          <a:lstStyle/>
-          <a:p>
-            <a:pPr algn="ctr"/>
-            <a:endParaRPr lang="de-DE"/>
-          </a:p>
-        </p:txBody>
-      </p:sp>
     </p:spTree>
     <p:extLst>
       <p:ext uri="{BB962C8B-B14F-4D97-AF65-F5344CB8AC3E}">
-        <p14:creationId xmlns:p14="http://schemas.microsoft.com/office/powerpoint/2010/main" val="2493029048"/>
+        <p14:creationId xmlns:p14="http://schemas.microsoft.com/office/powerpoint/2010/main" val="813849237"/>
       </p:ext>
     </p:extLst>
   </p:cSld>
@@ -12608,122 +12939,6 @@
           </a:p>
         </p:txBody>
       </p:sp>
-      <p:grpSp>
-        <p:nvGrpSpPr>
-          <p:cNvPr id="11" name="Group 10">
-            <a:extLst>
-              <a:ext uri="{FF2B5EF4-FFF2-40B4-BE49-F238E27FC236}">
-                <a16:creationId xmlns:a16="http://schemas.microsoft.com/office/drawing/2014/main" id="{1BA205E4-839A-7B41-9124-A21AFBAA0F94}"/>
-              </a:ext>
-            </a:extLst>
-          </p:cNvPr>
-          <p:cNvGrpSpPr/>
-          <p:nvPr/>
-        </p:nvGrpSpPr>
-        <p:grpSpPr>
-          <a:xfrm>
-            <a:off x="5875900" y="1539133"/>
-            <a:ext cx="9144000" cy="4977508"/>
-            <a:chOff x="0" y="1388331"/>
-            <a:chExt cx="9144000" cy="4977508"/>
-          </a:xfrm>
-        </p:grpSpPr>
-        <p:pic>
-          <p:nvPicPr>
-            <p:cNvPr id="9" name="Picture 8" descr="RL Taxonomy - Source: https://spinningup.openai.com/en/latest/spinningup/rl_intro2.html#citations-below">
-              <a:extLst>
-                <a:ext uri="{FF2B5EF4-FFF2-40B4-BE49-F238E27FC236}">
-                  <a16:creationId xmlns:a16="http://schemas.microsoft.com/office/drawing/2014/main" id="{A1CDD86F-CF90-2240-864E-7A8E7B4AFD33}"/>
-                </a:ext>
-              </a:extLst>
-            </p:cNvPr>
-            <p:cNvPicPr>
-              <a:picLocks noChangeAspect="1"/>
-            </p:cNvPicPr>
-            <p:nvPr/>
-          </p:nvPicPr>
-          <p:blipFill>
-            <a:blip r:embed="rId3">
-              <a:extLst>
-                <a:ext uri="{28A0092B-C50C-407E-A947-70E740481C1C}">
-                  <a14:useLocalDpi xmlns:a14="http://schemas.microsoft.com/office/drawing/2010/main" val="0"/>
-                </a:ext>
-              </a:extLst>
-            </a:blip>
-            <a:stretch>
-              <a:fillRect/>
-            </a:stretch>
-          </p:blipFill>
-          <p:spPr>
-            <a:xfrm>
-              <a:off x="0" y="1388331"/>
-              <a:ext cx="9144000" cy="4716477"/>
-            </a:xfrm>
-            <a:prstGeom prst="rect">
-              <a:avLst/>
-            </a:prstGeom>
-          </p:spPr>
-        </p:pic>
-        <p:sp>
-          <p:nvSpPr>
-            <p:cNvPr id="10" name="TextBox 9">
-              <a:extLst>
-                <a:ext uri="{FF2B5EF4-FFF2-40B4-BE49-F238E27FC236}">
-                  <a16:creationId xmlns:a16="http://schemas.microsoft.com/office/drawing/2014/main" id="{7A80CB37-08F8-F142-A753-E0DFB6C5B76A}"/>
-                </a:ext>
-              </a:extLst>
-            </p:cNvPr>
-            <p:cNvSpPr txBox="1"/>
-            <p:nvPr/>
-          </p:nvSpPr>
-          <p:spPr>
-            <a:xfrm>
-              <a:off x="6641444" y="6104229"/>
-              <a:ext cx="2289409" cy="261610"/>
-            </a:xfrm>
-            <a:prstGeom prst="rect">
-              <a:avLst/>
-            </a:prstGeom>
-            <a:noFill/>
-          </p:spPr>
-          <p:txBody>
-            <a:bodyPr wrap="none" rtlCol="0">
-              <a:spAutoFit/>
-            </a:bodyPr>
-            <a:lstStyle/>
-            <a:p>
-              <a:r>
-                <a:rPr lang="de-DE" sz="1100" dirty="0"/>
-                <a:t>A </a:t>
-              </a:r>
-              <a:r>
-                <a:rPr lang="de-DE" sz="1100" dirty="0" err="1"/>
-                <a:t>Taxonomy</a:t>
-              </a:r>
-              <a:r>
-                <a:rPr lang="de-DE" sz="1100" dirty="0"/>
-                <a:t> </a:t>
-              </a:r>
-              <a:r>
-                <a:rPr lang="de-DE" sz="1100" dirty="0" err="1"/>
-                <a:t>of</a:t>
-              </a:r>
-              <a:r>
-                <a:rPr lang="de-DE" sz="1100" dirty="0"/>
-                <a:t> RL </a:t>
-              </a:r>
-              <a:r>
-                <a:rPr lang="de-DE" sz="1100" dirty="0" err="1"/>
-                <a:t>Algorithms</a:t>
-              </a:r>
-              <a:r>
-                <a:rPr lang="de-DE" sz="1100" dirty="0"/>
-                <a:t> [2] </a:t>
-              </a:r>
-            </a:p>
-          </p:txBody>
-        </p:sp>
-      </p:grpSp>
     </p:spTree>
     <p:extLst>
       <p:ext uri="{BB962C8B-B14F-4D97-AF65-F5344CB8AC3E}">
@@ -12938,51 +13153,6 @@
                       </p:childTnLst>
                     </p:cTn>
                   </p:par>
-                  <p:par>
-                    <p:cTn id="19" fill="hold">
-                      <p:stCondLst>
-                        <p:cond delay="indefinite"/>
-                      </p:stCondLst>
-                      <p:childTnLst>
-                        <p:par>
-                          <p:cTn id="20" fill="hold">
-                            <p:stCondLst>
-                              <p:cond delay="0"/>
-                            </p:stCondLst>
-                            <p:childTnLst>
-                              <p:par>
-                                <p:cTn id="21" presetID="1" presetClass="entr" presetSubtype="0" fill="hold" nodeType="clickEffect">
-                                  <p:stCondLst>
-                                    <p:cond delay="0"/>
-                                  </p:stCondLst>
-                                  <p:childTnLst>
-                                    <p:set>
-                                      <p:cBhvr>
-                                        <p:cTn id="22" dur="1" fill="hold">
-                                          <p:stCondLst>
-                                            <p:cond delay="0"/>
-                                          </p:stCondLst>
-                                        </p:cTn>
-                                        <p:tgtEl>
-                                          <p:spTgt spid="11"/>
-                                        </p:tgtEl>
-                                        <p:attrNameLst>
-                                          <p:attrName>style.visibility</p:attrName>
-                                        </p:attrNameLst>
-                                      </p:cBhvr>
-                                      <p:to>
-                                        <p:strVal val="visible"/>
-                                      </p:to>
-                                    </p:set>
-                                  </p:childTnLst>
-                                </p:cTn>
-                              </p:par>
-                            </p:childTnLst>
-                          </p:cTn>
-                        </p:par>
-                      </p:childTnLst>
-                    </p:cTn>
-                  </p:par>
                 </p:childTnLst>
               </p:cTn>
               <p:prevCondLst>
@@ -13030,6 +13200,271 @@
           <p:cNvPr id="2" name="Title 1">
             <a:extLst>
               <a:ext uri="{FF2B5EF4-FFF2-40B4-BE49-F238E27FC236}">
+                <a16:creationId xmlns:a16="http://schemas.microsoft.com/office/drawing/2014/main" id="{13EDCF36-2B3D-7B4B-B557-639994418F60}"/>
+              </a:ext>
+            </a:extLst>
+          </p:cNvPr>
+          <p:cNvSpPr>
+            <a:spLocks noGrp="1"/>
+          </p:cNvSpPr>
+          <p:nvPr>
+            <p:ph type="title"/>
+          </p:nvPr>
+        </p:nvSpPr>
+        <p:spPr/>
+        <p:txBody>
+          <a:bodyPr/>
+          <a:lstStyle/>
+          <a:p>
+            <a:r>
+              <a:rPr lang="de-DE" dirty="0"/>
+              <a:t>Experiment: Walking </a:t>
+            </a:r>
+            <a:r>
+              <a:rPr lang="de-DE" dirty="0" err="1"/>
+              <a:t>Ant</a:t>
+            </a:r>
+            <a:endParaRPr lang="de-DE" dirty="0"/>
+          </a:p>
+        </p:txBody>
+      </p:sp>
+      <p:sp>
+        <p:nvSpPr>
+          <p:cNvPr id="3" name="Content Placeholder 2">
+            <a:extLst>
+              <a:ext uri="{FF2B5EF4-FFF2-40B4-BE49-F238E27FC236}">
+                <a16:creationId xmlns:a16="http://schemas.microsoft.com/office/drawing/2014/main" id="{F0E96634-3C1A-C840-A6FC-3030247742F3}"/>
+              </a:ext>
+            </a:extLst>
+          </p:cNvPr>
+          <p:cNvSpPr>
+            <a:spLocks noGrp="1"/>
+          </p:cNvSpPr>
+          <p:nvPr>
+            <p:ph sz="half" idx="1"/>
+          </p:nvPr>
+        </p:nvSpPr>
+        <p:spPr>
+          <a:xfrm>
+            <a:off x="457200" y="1701006"/>
+            <a:ext cx="8183563" cy="4319587"/>
+          </a:xfrm>
+        </p:spPr>
+        <p:txBody>
+          <a:bodyPr/>
+          <a:lstStyle/>
+          <a:p>
+            <a:endParaRPr lang="de-DE" dirty="0"/>
+          </a:p>
+          <a:p>
+            <a:endParaRPr lang="de-DE" dirty="0"/>
+          </a:p>
+        </p:txBody>
+      </p:sp>
+      <p:sp>
+        <p:nvSpPr>
+          <p:cNvPr id="5" name="Date Placeholder 4">
+            <a:extLst>
+              <a:ext uri="{FF2B5EF4-FFF2-40B4-BE49-F238E27FC236}">
+                <a16:creationId xmlns:a16="http://schemas.microsoft.com/office/drawing/2014/main" id="{B8C4BF55-1F43-3241-A7CB-978F0646D2DB}"/>
+              </a:ext>
+            </a:extLst>
+          </p:cNvPr>
+          <p:cNvSpPr>
+            <a:spLocks noGrp="1"/>
+          </p:cNvSpPr>
+          <p:nvPr>
+            <p:ph type="dt" sz="half" idx="10"/>
+          </p:nvPr>
+        </p:nvSpPr>
+        <p:spPr/>
+        <p:txBody>
+          <a:bodyPr/>
+          <a:lstStyle/>
+          <a:p>
+            <a:r>
+              <a:rPr lang="de-DE"/>
+              <a:t>15. Januar 2020</a:t>
+            </a:r>
+          </a:p>
+        </p:txBody>
+      </p:sp>
+      <p:sp>
+        <p:nvSpPr>
+          <p:cNvPr id="6" name="Footer Placeholder 5">
+            <a:extLst>
+              <a:ext uri="{FF2B5EF4-FFF2-40B4-BE49-F238E27FC236}">
+                <a16:creationId xmlns:a16="http://schemas.microsoft.com/office/drawing/2014/main" id="{D56D663D-B635-7F42-AF93-FE8D53ECDC00}"/>
+              </a:ext>
+            </a:extLst>
+          </p:cNvPr>
+          <p:cNvSpPr>
+            <a:spLocks noGrp="1"/>
+          </p:cNvSpPr>
+          <p:nvPr>
+            <p:ph type="ftr" sz="quarter" idx="11"/>
+          </p:nvPr>
+        </p:nvSpPr>
+        <p:spPr/>
+        <p:txBody>
+          <a:bodyPr/>
+          <a:lstStyle/>
+          <a:p>
+            <a:r>
+              <a:rPr lang="de-DE" b="1"/>
+              <a:t>Deep Reinforcement Learning: TD3</a:t>
+            </a:r>
+            <a:endParaRPr lang="de-DE" b="1" dirty="0"/>
+          </a:p>
+        </p:txBody>
+      </p:sp>
+      <p:sp>
+        <p:nvSpPr>
+          <p:cNvPr id="7" name="Slide Number Placeholder 6">
+            <a:extLst>
+              <a:ext uri="{FF2B5EF4-FFF2-40B4-BE49-F238E27FC236}">
+                <a16:creationId xmlns:a16="http://schemas.microsoft.com/office/drawing/2014/main" id="{F6676F9D-2383-3743-A4D8-2110743074EF}"/>
+              </a:ext>
+            </a:extLst>
+          </p:cNvPr>
+          <p:cNvSpPr>
+            <a:spLocks noGrp="1"/>
+          </p:cNvSpPr>
+          <p:nvPr>
+            <p:ph type="sldNum" sz="quarter" idx="12"/>
+          </p:nvPr>
+        </p:nvSpPr>
+        <p:spPr/>
+        <p:txBody>
+          <a:bodyPr/>
+          <a:lstStyle/>
+          <a:p>
+            <a:fld id="{8C8FEA95-401B-4A59-A0C9-740C061053CF}" type="slidenum">
+              <a:rPr lang="de-DE" smtClean="0"/>
+              <a:pPr/>
+              <a:t>30</a:t>
+            </a:fld>
+            <a:endParaRPr lang="de-DE"/>
+          </a:p>
+        </p:txBody>
+      </p:sp>
+      <p:pic>
+        <p:nvPicPr>
+          <p:cNvPr id="8" name="Picture 7" descr="A close up of a map&#10;&#10;Description automatically generated">
+            <a:extLst>
+              <a:ext uri="{FF2B5EF4-FFF2-40B4-BE49-F238E27FC236}">
+                <a16:creationId xmlns:a16="http://schemas.microsoft.com/office/drawing/2014/main" id="{B82E48DA-FECA-2F4B-BFC3-3E9BFD50A30F}"/>
+              </a:ext>
+            </a:extLst>
+          </p:cNvPr>
+          <p:cNvPicPr>
+            <a:picLocks noChangeAspect="1"/>
+          </p:cNvPicPr>
+          <p:nvPr/>
+        </p:nvPicPr>
+        <p:blipFill>
+          <a:blip r:embed="rId3">
+            <a:extLst>
+              <a:ext uri="{28A0092B-C50C-407E-A947-70E740481C1C}">
+                <a14:useLocalDpi xmlns:a14="http://schemas.microsoft.com/office/drawing/2010/main" val="0"/>
+              </a:ext>
+            </a:extLst>
+          </a:blip>
+          <a:stretch>
+            <a:fillRect/>
+          </a:stretch>
+        </p:blipFill>
+        <p:spPr>
+          <a:xfrm>
+            <a:off x="243681" y="2374899"/>
+            <a:ext cx="8610600" cy="2971800"/>
+          </a:xfrm>
+          <a:prstGeom prst="rect">
+            <a:avLst/>
+          </a:prstGeom>
+        </p:spPr>
+      </p:pic>
+      <p:sp>
+        <p:nvSpPr>
+          <p:cNvPr id="16" name="Down Arrow 15">
+            <a:extLst>
+              <a:ext uri="{FF2B5EF4-FFF2-40B4-BE49-F238E27FC236}">
+                <a16:creationId xmlns:a16="http://schemas.microsoft.com/office/drawing/2014/main" id="{354721A3-6684-9848-BFDC-896CF231C49D}"/>
+              </a:ext>
+            </a:extLst>
+          </p:cNvPr>
+          <p:cNvSpPr/>
+          <p:nvPr/>
+        </p:nvSpPr>
+        <p:spPr>
+          <a:xfrm rot="1274093">
+            <a:off x="721659" y="2389909"/>
+            <a:ext cx="360040" cy="1008112"/>
+          </a:xfrm>
+          <a:prstGeom prst="downArrow">
+            <a:avLst/>
+          </a:prstGeom>
+        </p:spPr>
+        <p:style>
+          <a:lnRef idx="2">
+            <a:schemeClr val="accent1">
+              <a:shade val="50000"/>
+            </a:schemeClr>
+          </a:lnRef>
+          <a:fillRef idx="1">
+            <a:schemeClr val="accent1"/>
+          </a:fillRef>
+          <a:effectRef idx="0">
+            <a:schemeClr val="accent1"/>
+          </a:effectRef>
+          <a:fontRef idx="minor">
+            <a:schemeClr val="lt1"/>
+          </a:fontRef>
+        </p:style>
+        <p:txBody>
+          <a:bodyPr rtlCol="0" anchor="ctr"/>
+          <a:lstStyle/>
+          <a:p>
+            <a:pPr algn="ctr"/>
+            <a:endParaRPr lang="de-DE"/>
+          </a:p>
+        </p:txBody>
+      </p:sp>
+    </p:spTree>
+    <p:extLst>
+      <p:ext uri="{BB962C8B-B14F-4D97-AF65-F5344CB8AC3E}">
+        <p14:creationId xmlns:p14="http://schemas.microsoft.com/office/powerpoint/2010/main" val="2493029048"/>
+      </p:ext>
+    </p:extLst>
+  </p:cSld>
+  <p:clrMapOvr>
+    <a:masterClrMapping/>
+  </p:clrMapOvr>
+</p:sld>
+</file>
+
+<file path=ppt/slides/slide31.xml><?xml version="1.0" encoding="utf-8"?>
+<p:sld xmlns:a="http://schemas.openxmlformats.org/drawingml/2006/main" xmlns:r="http://schemas.openxmlformats.org/officeDocument/2006/relationships" xmlns:p="http://schemas.openxmlformats.org/presentationml/2006/main">
+  <p:cSld>
+    <p:spTree>
+      <p:nvGrpSpPr>
+        <p:cNvPr id="1" name=""/>
+        <p:cNvGrpSpPr/>
+        <p:nvPr/>
+      </p:nvGrpSpPr>
+      <p:grpSpPr>
+        <a:xfrm>
+          <a:off x="0" y="0"/>
+          <a:ext cx="0" cy="0"/>
+          <a:chOff x="0" y="0"/>
+          <a:chExt cx="0" cy="0"/>
+        </a:xfrm>
+      </p:grpSpPr>
+      <p:sp>
+        <p:nvSpPr>
+          <p:cNvPr id="2" name="Title 1">
+            <a:extLst>
+              <a:ext uri="{FF2B5EF4-FFF2-40B4-BE49-F238E27FC236}">
                 <a16:creationId xmlns:a16="http://schemas.microsoft.com/office/drawing/2014/main" id="{57BB1349-640B-FD41-92C4-C24BA288CD3B}"/>
               </a:ext>
             </a:extLst>
@@ -13175,7 +13610,7 @@
             <a:fld id="{8C8FEA95-401B-4A59-A0C9-740C061053CF}" type="slidenum">
               <a:rPr lang="de-DE" smtClean="0"/>
               <a:pPr/>
-              <a:t>30</a:t>
+              <a:t>31</a:t>
             </a:fld>
             <a:endParaRPr lang="de-DE"/>
           </a:p>
@@ -13329,7 +13764,7 @@
 </p:sld>
 </file>
 
-<file path=ppt/slides/slide31.xml><?xml version="1.0" encoding="utf-8"?>
+<file path=ppt/slides/slide32.xml><?xml version="1.0" encoding="utf-8"?>
 <p:sld xmlns:a="http://schemas.openxmlformats.org/drawingml/2006/main" xmlns:r="http://schemas.openxmlformats.org/officeDocument/2006/relationships" xmlns:p="http://schemas.openxmlformats.org/presentationml/2006/main">
   <p:cSld>
     <p:spTree>
@@ -13499,7 +13934,7 @@
             <a:fld id="{8C8FEA95-401B-4A59-A0C9-740C061053CF}" type="slidenum">
               <a:rPr lang="de-DE" smtClean="0"/>
               <a:pPr/>
-              <a:t>31</a:t>
+              <a:t>32</a:t>
             </a:fld>
             <a:endParaRPr lang="de-DE"/>
           </a:p>
@@ -13600,7 +14035,7 @@
 </p:sld>
 </file>
 
-<file path=ppt/slides/slide32.xml><?xml version="1.0" encoding="utf-8"?>
+<file path=ppt/slides/slide33.xml><?xml version="1.0" encoding="utf-8"?>
 <p:sld xmlns:a="http://schemas.openxmlformats.org/drawingml/2006/main" xmlns:r="http://schemas.openxmlformats.org/officeDocument/2006/relationships" xmlns:p="http://schemas.openxmlformats.org/presentationml/2006/main">
   <p:cSld>
     <p:spTree>
@@ -13731,7 +14166,7 @@
             <a:fld id="{8C8FEA95-401B-4A59-A0C9-740C061053CF}" type="slidenum">
               <a:rPr lang="de-DE" smtClean="0"/>
               <a:pPr/>
-              <a:t>32</a:t>
+              <a:t>33</a:t>
             </a:fld>
             <a:endParaRPr lang="de-DE"/>
           </a:p>
@@ -13921,7 +14356,7 @@
 </p:sld>
 </file>
 
-<file path=ppt/slides/slide33.xml><?xml version="1.0" encoding="utf-8"?>
+<file path=ppt/slides/slide34.xml><?xml version="1.0" encoding="utf-8"?>
 <p:sld xmlns:a="http://schemas.openxmlformats.org/drawingml/2006/main" xmlns:r="http://schemas.openxmlformats.org/officeDocument/2006/relationships" xmlns:p="http://schemas.openxmlformats.org/presentationml/2006/main">
   <p:cSld>
     <p:spTree>
@@ -14085,7 +14520,7 @@
             <a:fld id="{8C8FEA95-401B-4A59-A0C9-740C061053CF}" type="slidenum">
               <a:rPr lang="de-DE" smtClean="0"/>
               <a:pPr/>
-              <a:t>33</a:t>
+              <a:t>34</a:t>
             </a:fld>
             <a:endParaRPr lang="de-DE"/>
           </a:p>
@@ -14186,7 +14621,7 @@
 </p:sld>
 </file>
 
-<file path=ppt/slides/slide34.xml><?xml version="1.0" encoding="utf-8"?>
+<file path=ppt/slides/slide35.xml><?xml version="1.0" encoding="utf-8"?>
 <p:sld xmlns:a="http://schemas.openxmlformats.org/drawingml/2006/main" xmlns:r="http://schemas.openxmlformats.org/officeDocument/2006/relationships" xmlns:p="http://schemas.openxmlformats.org/presentationml/2006/main">
   <p:cSld>
     <p:spTree>
@@ -14317,7 +14752,7 @@
             <a:fld id="{8C8FEA95-401B-4A59-A0C9-740C061053CF}" type="slidenum">
               <a:rPr lang="de-DE" smtClean="0"/>
               <a:pPr/>
-              <a:t>34</a:t>
+              <a:t>35</a:t>
             </a:fld>
             <a:endParaRPr lang="de-DE"/>
           </a:p>
@@ -14507,169 +14942,6 @@
 </p:sld>
 </file>
 
-<file path=ppt/slides/slide35.xml><?xml version="1.0" encoding="utf-8"?>
-<p:sld xmlns:a="http://schemas.openxmlformats.org/drawingml/2006/main" xmlns:r="http://schemas.openxmlformats.org/officeDocument/2006/relationships" xmlns:p="http://schemas.openxmlformats.org/presentationml/2006/main">
-  <p:cSld>
-    <p:spTree>
-      <p:nvGrpSpPr>
-        <p:cNvPr id="1" name=""/>
-        <p:cNvGrpSpPr/>
-        <p:nvPr/>
-      </p:nvGrpSpPr>
-      <p:grpSpPr>
-        <a:xfrm>
-          <a:off x="0" y="0"/>
-          <a:ext cx="0" cy="0"/>
-          <a:chOff x="0" y="0"/>
-          <a:chExt cx="0" cy="0"/>
-        </a:xfrm>
-      </p:grpSpPr>
-      <p:sp>
-        <p:nvSpPr>
-          <p:cNvPr id="2" name="Title 1">
-            <a:extLst>
-              <a:ext uri="{FF2B5EF4-FFF2-40B4-BE49-F238E27FC236}">
-                <a16:creationId xmlns:a16="http://schemas.microsoft.com/office/drawing/2014/main" id="{57BB1349-640B-FD41-92C4-C24BA288CD3B}"/>
-              </a:ext>
-            </a:extLst>
-          </p:cNvPr>
-          <p:cNvSpPr>
-            <a:spLocks noGrp="1"/>
-          </p:cNvSpPr>
-          <p:nvPr>
-            <p:ph type="title"/>
-          </p:nvPr>
-        </p:nvSpPr>
-        <p:spPr>
-          <a:xfrm>
-            <a:off x="-3564904" y="1844824"/>
-            <a:ext cx="6707188" cy="863600"/>
-          </a:xfrm>
-        </p:spPr>
-        <p:txBody>
-          <a:bodyPr/>
-          <a:lstStyle/>
-          <a:p>
-            <a:pPr algn="r"/>
-            <a:r>
-              <a:rPr lang="de-DE" sz="3200" dirty="0" err="1"/>
-              <a:t>Thank</a:t>
-            </a:r>
-            <a:r>
-              <a:rPr lang="de-DE" sz="3200" dirty="0"/>
-              <a:t> </a:t>
-            </a:r>
-            <a:r>
-              <a:rPr lang="de-DE" sz="3200" dirty="0" err="1"/>
-              <a:t>you</a:t>
-            </a:r>
-            <a:r>
-              <a:rPr lang="de-DE" sz="3200" dirty="0"/>
-              <a:t>!</a:t>
-            </a:r>
-          </a:p>
-        </p:txBody>
-      </p:sp>
-      <p:sp>
-        <p:nvSpPr>
-          <p:cNvPr id="5" name="Date Placeholder 4">
-            <a:extLst>
-              <a:ext uri="{FF2B5EF4-FFF2-40B4-BE49-F238E27FC236}">
-                <a16:creationId xmlns:a16="http://schemas.microsoft.com/office/drawing/2014/main" id="{E93FD3F4-0882-4F40-947B-97F77945DB0A}"/>
-              </a:ext>
-            </a:extLst>
-          </p:cNvPr>
-          <p:cNvSpPr>
-            <a:spLocks noGrp="1"/>
-          </p:cNvSpPr>
-          <p:nvPr>
-            <p:ph type="dt" sz="half" idx="10"/>
-          </p:nvPr>
-        </p:nvSpPr>
-        <p:spPr/>
-        <p:txBody>
-          <a:bodyPr/>
-          <a:lstStyle/>
-          <a:p>
-            <a:r>
-              <a:rPr lang="de-DE"/>
-              <a:t>15. Januar 2020</a:t>
-            </a:r>
-          </a:p>
-        </p:txBody>
-      </p:sp>
-      <p:sp>
-        <p:nvSpPr>
-          <p:cNvPr id="6" name="Footer Placeholder 5">
-            <a:extLst>
-              <a:ext uri="{FF2B5EF4-FFF2-40B4-BE49-F238E27FC236}">
-                <a16:creationId xmlns:a16="http://schemas.microsoft.com/office/drawing/2014/main" id="{68A84E67-E389-7143-9DF7-8C4C0E5289E0}"/>
-              </a:ext>
-            </a:extLst>
-          </p:cNvPr>
-          <p:cNvSpPr>
-            <a:spLocks noGrp="1"/>
-          </p:cNvSpPr>
-          <p:nvPr>
-            <p:ph type="ftr" sz="quarter" idx="11"/>
-          </p:nvPr>
-        </p:nvSpPr>
-        <p:spPr/>
-        <p:txBody>
-          <a:bodyPr/>
-          <a:lstStyle/>
-          <a:p>
-            <a:r>
-              <a:rPr lang="de-DE" b="1"/>
-              <a:t>Deep Reinforcement Learning: TD3</a:t>
-            </a:r>
-            <a:endParaRPr lang="de-DE" b="1" dirty="0"/>
-          </a:p>
-        </p:txBody>
-      </p:sp>
-      <p:sp>
-        <p:nvSpPr>
-          <p:cNvPr id="7" name="Slide Number Placeholder 6">
-            <a:extLst>
-              <a:ext uri="{FF2B5EF4-FFF2-40B4-BE49-F238E27FC236}">
-                <a16:creationId xmlns:a16="http://schemas.microsoft.com/office/drawing/2014/main" id="{FADA2B75-439A-1341-9B69-1A5867B11A4B}"/>
-              </a:ext>
-            </a:extLst>
-          </p:cNvPr>
-          <p:cNvSpPr>
-            <a:spLocks noGrp="1"/>
-          </p:cNvSpPr>
-          <p:nvPr>
-            <p:ph type="sldNum" sz="quarter" idx="12"/>
-          </p:nvPr>
-        </p:nvSpPr>
-        <p:spPr/>
-        <p:txBody>
-          <a:bodyPr/>
-          <a:lstStyle/>
-          <a:p>
-            <a:fld id="{8C8FEA95-401B-4A59-A0C9-740C061053CF}" type="slidenum">
-              <a:rPr lang="de-DE" smtClean="0"/>
-              <a:pPr/>
-              <a:t>35</a:t>
-            </a:fld>
-            <a:endParaRPr lang="de-DE"/>
-          </a:p>
-        </p:txBody>
-      </p:sp>
-    </p:spTree>
-    <p:extLst>
-      <p:ext uri="{BB962C8B-B14F-4D97-AF65-F5344CB8AC3E}">
-        <p14:creationId xmlns:p14="http://schemas.microsoft.com/office/powerpoint/2010/main" val="1833574902"/>
-      </p:ext>
-    </p:extLst>
-  </p:cSld>
-  <p:clrMapOvr>
-    <a:masterClrMapping/>
-  </p:clrMapOvr>
-</p:sld>
-</file>
-
 <file path=ppt/slides/slide36.xml><?xml version="1.0" encoding="utf-8"?>
 <p:sld xmlns:a="http://schemas.openxmlformats.org/drawingml/2006/main" xmlns:r="http://schemas.openxmlformats.org/officeDocument/2006/relationships" xmlns:p="http://schemas.openxmlformats.org/presentationml/2006/main">
   <p:cSld>
@@ -14692,6 +14964,169 @@
           <p:cNvPr id="2" name="Title 1">
             <a:extLst>
               <a:ext uri="{FF2B5EF4-FFF2-40B4-BE49-F238E27FC236}">
+                <a16:creationId xmlns:a16="http://schemas.microsoft.com/office/drawing/2014/main" id="{57BB1349-640B-FD41-92C4-C24BA288CD3B}"/>
+              </a:ext>
+            </a:extLst>
+          </p:cNvPr>
+          <p:cNvSpPr>
+            <a:spLocks noGrp="1"/>
+          </p:cNvSpPr>
+          <p:nvPr>
+            <p:ph type="title"/>
+          </p:nvPr>
+        </p:nvSpPr>
+        <p:spPr>
+          <a:xfrm>
+            <a:off x="-3564904" y="1844824"/>
+            <a:ext cx="6707188" cy="863600"/>
+          </a:xfrm>
+        </p:spPr>
+        <p:txBody>
+          <a:bodyPr/>
+          <a:lstStyle/>
+          <a:p>
+            <a:pPr algn="r"/>
+            <a:r>
+              <a:rPr lang="de-DE" sz="3200" dirty="0" err="1"/>
+              <a:t>Thank</a:t>
+            </a:r>
+            <a:r>
+              <a:rPr lang="de-DE" sz="3200" dirty="0"/>
+              <a:t> </a:t>
+            </a:r>
+            <a:r>
+              <a:rPr lang="de-DE" sz="3200" dirty="0" err="1"/>
+              <a:t>you</a:t>
+            </a:r>
+            <a:r>
+              <a:rPr lang="de-DE" sz="3200" dirty="0"/>
+              <a:t>!</a:t>
+            </a:r>
+          </a:p>
+        </p:txBody>
+      </p:sp>
+      <p:sp>
+        <p:nvSpPr>
+          <p:cNvPr id="5" name="Date Placeholder 4">
+            <a:extLst>
+              <a:ext uri="{FF2B5EF4-FFF2-40B4-BE49-F238E27FC236}">
+                <a16:creationId xmlns:a16="http://schemas.microsoft.com/office/drawing/2014/main" id="{E93FD3F4-0882-4F40-947B-97F77945DB0A}"/>
+              </a:ext>
+            </a:extLst>
+          </p:cNvPr>
+          <p:cNvSpPr>
+            <a:spLocks noGrp="1"/>
+          </p:cNvSpPr>
+          <p:nvPr>
+            <p:ph type="dt" sz="half" idx="10"/>
+          </p:nvPr>
+        </p:nvSpPr>
+        <p:spPr/>
+        <p:txBody>
+          <a:bodyPr/>
+          <a:lstStyle/>
+          <a:p>
+            <a:r>
+              <a:rPr lang="de-DE"/>
+              <a:t>15. Januar 2020</a:t>
+            </a:r>
+          </a:p>
+        </p:txBody>
+      </p:sp>
+      <p:sp>
+        <p:nvSpPr>
+          <p:cNvPr id="6" name="Footer Placeholder 5">
+            <a:extLst>
+              <a:ext uri="{FF2B5EF4-FFF2-40B4-BE49-F238E27FC236}">
+                <a16:creationId xmlns:a16="http://schemas.microsoft.com/office/drawing/2014/main" id="{68A84E67-E389-7143-9DF7-8C4C0E5289E0}"/>
+              </a:ext>
+            </a:extLst>
+          </p:cNvPr>
+          <p:cNvSpPr>
+            <a:spLocks noGrp="1"/>
+          </p:cNvSpPr>
+          <p:nvPr>
+            <p:ph type="ftr" sz="quarter" idx="11"/>
+          </p:nvPr>
+        </p:nvSpPr>
+        <p:spPr/>
+        <p:txBody>
+          <a:bodyPr/>
+          <a:lstStyle/>
+          <a:p>
+            <a:r>
+              <a:rPr lang="de-DE" b="1"/>
+              <a:t>Deep Reinforcement Learning: TD3</a:t>
+            </a:r>
+            <a:endParaRPr lang="de-DE" b="1" dirty="0"/>
+          </a:p>
+        </p:txBody>
+      </p:sp>
+      <p:sp>
+        <p:nvSpPr>
+          <p:cNvPr id="7" name="Slide Number Placeholder 6">
+            <a:extLst>
+              <a:ext uri="{FF2B5EF4-FFF2-40B4-BE49-F238E27FC236}">
+                <a16:creationId xmlns:a16="http://schemas.microsoft.com/office/drawing/2014/main" id="{FADA2B75-439A-1341-9B69-1A5867B11A4B}"/>
+              </a:ext>
+            </a:extLst>
+          </p:cNvPr>
+          <p:cNvSpPr>
+            <a:spLocks noGrp="1"/>
+          </p:cNvSpPr>
+          <p:nvPr>
+            <p:ph type="sldNum" sz="quarter" idx="12"/>
+          </p:nvPr>
+        </p:nvSpPr>
+        <p:spPr/>
+        <p:txBody>
+          <a:bodyPr/>
+          <a:lstStyle/>
+          <a:p>
+            <a:fld id="{8C8FEA95-401B-4A59-A0C9-740C061053CF}" type="slidenum">
+              <a:rPr lang="de-DE" smtClean="0"/>
+              <a:pPr/>
+              <a:t>36</a:t>
+            </a:fld>
+            <a:endParaRPr lang="de-DE"/>
+          </a:p>
+        </p:txBody>
+      </p:sp>
+    </p:spTree>
+    <p:extLst>
+      <p:ext uri="{BB962C8B-B14F-4D97-AF65-F5344CB8AC3E}">
+        <p14:creationId xmlns:p14="http://schemas.microsoft.com/office/powerpoint/2010/main" val="1833574902"/>
+      </p:ext>
+    </p:extLst>
+  </p:cSld>
+  <p:clrMapOvr>
+    <a:masterClrMapping/>
+  </p:clrMapOvr>
+</p:sld>
+</file>
+
+<file path=ppt/slides/slide37.xml><?xml version="1.0" encoding="utf-8"?>
+<p:sld xmlns:a="http://schemas.openxmlformats.org/drawingml/2006/main" xmlns:r="http://schemas.openxmlformats.org/officeDocument/2006/relationships" xmlns:p="http://schemas.openxmlformats.org/presentationml/2006/main">
+  <p:cSld>
+    <p:spTree>
+      <p:nvGrpSpPr>
+        <p:cNvPr id="1" name=""/>
+        <p:cNvGrpSpPr/>
+        <p:nvPr/>
+      </p:nvGrpSpPr>
+      <p:grpSpPr>
+        <a:xfrm>
+          <a:off x="0" y="0"/>
+          <a:ext cx="0" cy="0"/>
+          <a:chOff x="0" y="0"/>
+          <a:chExt cx="0" cy="0"/>
+        </a:xfrm>
+      </p:grpSpPr>
+      <p:sp>
+        <p:nvSpPr>
+          <p:cNvPr id="2" name="Title 1">
+            <a:extLst>
+              <a:ext uri="{FF2B5EF4-FFF2-40B4-BE49-F238E27FC236}">
                 <a16:creationId xmlns:a16="http://schemas.microsoft.com/office/drawing/2014/main" id="{3284B39D-F04E-6444-9EFF-7376DB70E5D7}"/>
               </a:ext>
             </a:extLst>
@@ -14975,7 +15410,7 @@
             <a:fld id="{8C8FEA95-401B-4A59-A0C9-740C061053CF}" type="slidenum">
               <a:rPr lang="de-DE" smtClean="0"/>
               <a:pPr/>
-              <a:t>36</a:t>
+              <a:t>37</a:t>
             </a:fld>
             <a:endParaRPr lang="de-DE"/>
           </a:p>
@@ -15016,6 +15451,393 @@
           <p:cNvPr id="2" name="Title 1">
             <a:extLst>
               <a:ext uri="{FF2B5EF4-FFF2-40B4-BE49-F238E27FC236}">
+                <a16:creationId xmlns:a16="http://schemas.microsoft.com/office/drawing/2014/main" id="{14BAC78B-C6FC-9E48-B3F1-408FDCF80116}"/>
+              </a:ext>
+            </a:extLst>
+          </p:cNvPr>
+          <p:cNvSpPr>
+            <a:spLocks noGrp="1"/>
+          </p:cNvSpPr>
+          <p:nvPr>
+            <p:ph type="title"/>
+          </p:nvPr>
+        </p:nvSpPr>
+        <p:spPr/>
+        <p:txBody>
+          <a:bodyPr/>
+          <a:lstStyle/>
+          <a:p>
+            <a:r>
+              <a:rPr lang="de-DE"/>
+              <a:t>TD3</a:t>
+            </a:r>
+            <a:endParaRPr lang="en-DE"/>
+          </a:p>
+        </p:txBody>
+      </p:sp>
+      <p:sp>
+        <p:nvSpPr>
+          <p:cNvPr id="3" name="Content Placeholder 2">
+            <a:extLst>
+              <a:ext uri="{FF2B5EF4-FFF2-40B4-BE49-F238E27FC236}">
+                <a16:creationId xmlns:a16="http://schemas.microsoft.com/office/drawing/2014/main" id="{28ED8D45-35F6-1541-882A-44DF92C89BC1}"/>
+              </a:ext>
+            </a:extLst>
+          </p:cNvPr>
+          <p:cNvSpPr>
+            <a:spLocks noGrp="1"/>
+          </p:cNvSpPr>
+          <p:nvPr>
+            <p:ph sz="half" idx="1"/>
+          </p:nvPr>
+        </p:nvSpPr>
+        <p:spPr/>
+        <p:txBody>
+          <a:bodyPr/>
+          <a:lstStyle/>
+          <a:p>
+            <a:endParaRPr lang="en-DE"/>
+          </a:p>
+        </p:txBody>
+      </p:sp>
+      <p:sp>
+        <p:nvSpPr>
+          <p:cNvPr id="4" name="Content Placeholder 3">
+            <a:extLst>
+              <a:ext uri="{FF2B5EF4-FFF2-40B4-BE49-F238E27FC236}">
+                <a16:creationId xmlns:a16="http://schemas.microsoft.com/office/drawing/2014/main" id="{96BA06DE-05CA-3443-8902-AE8D40B45087}"/>
+              </a:ext>
+            </a:extLst>
+          </p:cNvPr>
+          <p:cNvSpPr>
+            <a:spLocks noGrp="1"/>
+          </p:cNvSpPr>
+          <p:nvPr>
+            <p:ph sz="half" idx="2"/>
+          </p:nvPr>
+        </p:nvSpPr>
+        <p:spPr/>
+        <p:txBody>
+          <a:bodyPr/>
+          <a:lstStyle/>
+          <a:p>
+            <a:endParaRPr lang="en-DE"/>
+          </a:p>
+        </p:txBody>
+      </p:sp>
+      <p:sp>
+        <p:nvSpPr>
+          <p:cNvPr id="5" name="Date Placeholder 4">
+            <a:extLst>
+              <a:ext uri="{FF2B5EF4-FFF2-40B4-BE49-F238E27FC236}">
+                <a16:creationId xmlns:a16="http://schemas.microsoft.com/office/drawing/2014/main" id="{15B12387-011B-3F41-B489-776423F3D8F6}"/>
+              </a:ext>
+            </a:extLst>
+          </p:cNvPr>
+          <p:cNvSpPr>
+            <a:spLocks noGrp="1"/>
+          </p:cNvSpPr>
+          <p:nvPr>
+            <p:ph type="dt" sz="half" idx="10"/>
+          </p:nvPr>
+        </p:nvSpPr>
+        <p:spPr/>
+        <p:txBody>
+          <a:bodyPr/>
+          <a:lstStyle/>
+          <a:p>
+            <a:r>
+              <a:rPr lang="de-DE"/>
+              <a:t>15. Januar 2020</a:t>
+            </a:r>
+          </a:p>
+        </p:txBody>
+      </p:sp>
+      <p:sp>
+        <p:nvSpPr>
+          <p:cNvPr id="6" name="Footer Placeholder 5">
+            <a:extLst>
+              <a:ext uri="{FF2B5EF4-FFF2-40B4-BE49-F238E27FC236}">
+                <a16:creationId xmlns:a16="http://schemas.microsoft.com/office/drawing/2014/main" id="{2C8EC4CE-ADB6-FB43-BCBF-4E60FC3BD377}"/>
+              </a:ext>
+            </a:extLst>
+          </p:cNvPr>
+          <p:cNvSpPr>
+            <a:spLocks noGrp="1"/>
+          </p:cNvSpPr>
+          <p:nvPr>
+            <p:ph type="ftr" sz="quarter" idx="11"/>
+          </p:nvPr>
+        </p:nvSpPr>
+        <p:spPr/>
+        <p:txBody>
+          <a:bodyPr/>
+          <a:lstStyle/>
+          <a:p>
+            <a:r>
+              <a:rPr lang="de-DE" b="1"/>
+              <a:t>Deep Reinforcement Learning: TD3</a:t>
+            </a:r>
+            <a:endParaRPr lang="de-DE" b="1" dirty="0"/>
+          </a:p>
+        </p:txBody>
+      </p:sp>
+      <p:sp>
+        <p:nvSpPr>
+          <p:cNvPr id="7" name="Slide Number Placeholder 6">
+            <a:extLst>
+              <a:ext uri="{FF2B5EF4-FFF2-40B4-BE49-F238E27FC236}">
+                <a16:creationId xmlns:a16="http://schemas.microsoft.com/office/drawing/2014/main" id="{F5D71CE1-67C1-7243-AD89-97C136C846B3}"/>
+              </a:ext>
+            </a:extLst>
+          </p:cNvPr>
+          <p:cNvSpPr>
+            <a:spLocks noGrp="1"/>
+          </p:cNvSpPr>
+          <p:nvPr>
+            <p:ph type="sldNum" sz="quarter" idx="12"/>
+          </p:nvPr>
+        </p:nvSpPr>
+        <p:spPr/>
+        <p:txBody>
+          <a:bodyPr/>
+          <a:lstStyle/>
+          <a:p>
+            <a:fld id="{8C8FEA95-401B-4A59-A0C9-740C061053CF}" type="slidenum">
+              <a:rPr lang="de-DE" smtClean="0"/>
+              <a:pPr/>
+              <a:t>4</a:t>
+            </a:fld>
+            <a:endParaRPr lang="de-DE"/>
+          </a:p>
+        </p:txBody>
+      </p:sp>
+      <p:grpSp>
+        <p:nvGrpSpPr>
+          <p:cNvPr id="8" name="Group 7">
+            <a:extLst>
+              <a:ext uri="{FF2B5EF4-FFF2-40B4-BE49-F238E27FC236}">
+                <a16:creationId xmlns:a16="http://schemas.microsoft.com/office/drawing/2014/main" id="{B36415EF-BA5A-F049-BC90-62D282387CCB}"/>
+              </a:ext>
+            </a:extLst>
+          </p:cNvPr>
+          <p:cNvGrpSpPr/>
+          <p:nvPr/>
+        </p:nvGrpSpPr>
+        <p:grpSpPr>
+          <a:xfrm>
+            <a:off x="0" y="1547117"/>
+            <a:ext cx="9144000" cy="4977508"/>
+            <a:chOff x="0" y="1388331"/>
+            <a:chExt cx="9144000" cy="4977508"/>
+          </a:xfrm>
+        </p:grpSpPr>
+        <p:pic>
+          <p:nvPicPr>
+            <p:cNvPr id="9" name="Picture 8" descr="RL Taxonomy - Source: https://spinningup.openai.com/en/latest/spinningup/rl_intro2.html#citations-below">
+              <a:extLst>
+                <a:ext uri="{FF2B5EF4-FFF2-40B4-BE49-F238E27FC236}">
+                  <a16:creationId xmlns:a16="http://schemas.microsoft.com/office/drawing/2014/main" id="{C2E364A4-14C6-7449-98B8-9EDE22657D60}"/>
+                </a:ext>
+              </a:extLst>
+            </p:cNvPr>
+            <p:cNvPicPr>
+              <a:picLocks noChangeAspect="1"/>
+            </p:cNvPicPr>
+            <p:nvPr/>
+          </p:nvPicPr>
+          <p:blipFill>
+            <a:blip r:embed="rId2">
+              <a:extLst>
+                <a:ext uri="{28A0092B-C50C-407E-A947-70E740481C1C}">
+                  <a14:useLocalDpi xmlns:a14="http://schemas.microsoft.com/office/drawing/2010/main" val="0"/>
+                </a:ext>
+              </a:extLst>
+            </a:blip>
+            <a:stretch>
+              <a:fillRect/>
+            </a:stretch>
+          </p:blipFill>
+          <p:spPr>
+            <a:xfrm>
+              <a:off x="0" y="1388331"/>
+              <a:ext cx="9144000" cy="4716477"/>
+            </a:xfrm>
+            <a:prstGeom prst="rect">
+              <a:avLst/>
+            </a:prstGeom>
+          </p:spPr>
+        </p:pic>
+        <p:sp>
+          <p:nvSpPr>
+            <p:cNvPr id="10" name="TextBox 9">
+              <a:extLst>
+                <a:ext uri="{FF2B5EF4-FFF2-40B4-BE49-F238E27FC236}">
+                  <a16:creationId xmlns:a16="http://schemas.microsoft.com/office/drawing/2014/main" id="{5676BED3-E991-4E4F-B46C-D97C10FA6068}"/>
+                </a:ext>
+              </a:extLst>
+            </p:cNvPr>
+            <p:cNvSpPr txBox="1"/>
+            <p:nvPr/>
+          </p:nvSpPr>
+          <p:spPr>
+            <a:xfrm>
+              <a:off x="6641444" y="6104229"/>
+              <a:ext cx="2289409" cy="261610"/>
+            </a:xfrm>
+            <a:prstGeom prst="rect">
+              <a:avLst/>
+            </a:prstGeom>
+            <a:noFill/>
+          </p:spPr>
+          <p:txBody>
+            <a:bodyPr wrap="none" rtlCol="0">
+              <a:spAutoFit/>
+            </a:bodyPr>
+            <a:lstStyle/>
+            <a:p>
+              <a:r>
+                <a:rPr lang="de-DE" sz="1100" dirty="0"/>
+                <a:t>A </a:t>
+              </a:r>
+              <a:r>
+                <a:rPr lang="de-DE" sz="1100" dirty="0" err="1"/>
+                <a:t>Taxonomy</a:t>
+              </a:r>
+              <a:r>
+                <a:rPr lang="de-DE" sz="1100" dirty="0"/>
+                <a:t> </a:t>
+              </a:r>
+              <a:r>
+                <a:rPr lang="de-DE" sz="1100" dirty="0" err="1"/>
+                <a:t>of</a:t>
+              </a:r>
+              <a:r>
+                <a:rPr lang="de-DE" sz="1100" dirty="0"/>
+                <a:t> RL </a:t>
+              </a:r>
+              <a:r>
+                <a:rPr lang="de-DE" sz="1100" dirty="0" err="1"/>
+                <a:t>Algorithms</a:t>
+              </a:r>
+              <a:r>
+                <a:rPr lang="de-DE" sz="1100" dirty="0"/>
+                <a:t> [2] </a:t>
+              </a:r>
+            </a:p>
+          </p:txBody>
+        </p:sp>
+      </p:grpSp>
+    </p:spTree>
+    <p:extLst>
+      <p:ext uri="{BB962C8B-B14F-4D97-AF65-F5344CB8AC3E}">
+        <p14:creationId xmlns:p14="http://schemas.microsoft.com/office/powerpoint/2010/main" val="3446662233"/>
+      </p:ext>
+    </p:extLst>
+  </p:cSld>
+  <p:clrMapOvr>
+    <a:masterClrMapping/>
+  </p:clrMapOvr>
+  <p:timing>
+    <p:tnLst>
+      <p:par>
+        <p:cTn id="1" dur="indefinite" restart="never" nodeType="tmRoot">
+          <p:childTnLst>
+            <p:seq concurrent="1" nextAc="seek">
+              <p:cTn id="2" dur="indefinite" nodeType="mainSeq">
+                <p:childTnLst>
+                  <p:par>
+                    <p:cTn id="3" fill="hold">
+                      <p:stCondLst>
+                        <p:cond delay="indefinite"/>
+                      </p:stCondLst>
+                      <p:childTnLst>
+                        <p:par>
+                          <p:cTn id="4" fill="hold">
+                            <p:stCondLst>
+                              <p:cond delay="0"/>
+                            </p:stCondLst>
+                            <p:childTnLst>
+                              <p:par>
+                                <p:cTn id="5" presetID="1" presetClass="entr" presetSubtype="0" fill="hold" nodeType="clickEffect">
+                                  <p:stCondLst>
+                                    <p:cond delay="0"/>
+                                  </p:stCondLst>
+                                  <p:childTnLst>
+                                    <p:set>
+                                      <p:cBhvr>
+                                        <p:cTn id="6" dur="1" fill="hold">
+                                          <p:stCondLst>
+                                            <p:cond delay="0"/>
+                                          </p:stCondLst>
+                                        </p:cTn>
+                                        <p:tgtEl>
+                                          <p:spTgt spid="8"/>
+                                        </p:tgtEl>
+                                        <p:attrNameLst>
+                                          <p:attrName>style.visibility</p:attrName>
+                                        </p:attrNameLst>
+                                      </p:cBhvr>
+                                      <p:to>
+                                        <p:strVal val="visible"/>
+                                      </p:to>
+                                    </p:set>
+                                  </p:childTnLst>
+                                </p:cTn>
+                              </p:par>
+                            </p:childTnLst>
+                          </p:cTn>
+                        </p:par>
+                      </p:childTnLst>
+                    </p:cTn>
+                  </p:par>
+                </p:childTnLst>
+              </p:cTn>
+              <p:prevCondLst>
+                <p:cond evt="onPrev" delay="0">
+                  <p:tgtEl>
+                    <p:sldTgt/>
+                  </p:tgtEl>
+                </p:cond>
+              </p:prevCondLst>
+              <p:nextCondLst>
+                <p:cond evt="onNext" delay="0">
+                  <p:tgtEl>
+                    <p:sldTgt/>
+                  </p:tgtEl>
+                </p:cond>
+              </p:nextCondLst>
+            </p:seq>
+          </p:childTnLst>
+        </p:cTn>
+      </p:par>
+    </p:tnLst>
+  </p:timing>
+</p:sld>
+</file>
+
+<file path=ppt/slides/slide5.xml><?xml version="1.0" encoding="utf-8"?>
+<p:sld xmlns:a="http://schemas.openxmlformats.org/drawingml/2006/main" xmlns:r="http://schemas.openxmlformats.org/officeDocument/2006/relationships" xmlns:p="http://schemas.openxmlformats.org/presentationml/2006/main">
+  <p:cSld>
+    <p:spTree>
+      <p:nvGrpSpPr>
+        <p:cNvPr id="1" name=""/>
+        <p:cNvGrpSpPr/>
+        <p:nvPr/>
+      </p:nvGrpSpPr>
+      <p:grpSpPr>
+        <a:xfrm>
+          <a:off x="0" y="0"/>
+          <a:ext cx="0" cy="0"/>
+          <a:chOff x="0" y="0"/>
+          <a:chExt cx="0" cy="0"/>
+        </a:xfrm>
+      </p:grpSpPr>
+      <p:sp>
+        <p:nvSpPr>
+          <p:cNvPr id="2" name="Title 1">
+            <a:extLst>
+              <a:ext uri="{FF2B5EF4-FFF2-40B4-BE49-F238E27FC236}">
                 <a16:creationId xmlns:a16="http://schemas.microsoft.com/office/drawing/2014/main" id="{C0E3AA40-BBA6-C740-8320-D1A857F07B0B}"/>
               </a:ext>
             </a:extLst>
@@ -15446,7 +16268,7 @@
             <a:fld id="{8C8FEA95-401B-4A59-A0C9-740C061053CF}" type="slidenum">
               <a:rPr lang="de-DE" smtClean="0"/>
               <a:pPr/>
-              <a:t>4</a:t>
+              <a:t>5</a:t>
             </a:fld>
             <a:endParaRPr lang="de-DE"/>
           </a:p>
@@ -16000,7 +16822,7 @@
 </p:sld>
 </file>
 
-<file path=ppt/slides/slide5.xml><?xml version="1.0" encoding="utf-8"?>
+<file path=ppt/slides/slide6.xml><?xml version="1.0" encoding="utf-8"?>
 <p:sld xmlns:a="http://schemas.openxmlformats.org/drawingml/2006/main" xmlns:r="http://schemas.openxmlformats.org/officeDocument/2006/relationships" xmlns:p="http://schemas.openxmlformats.org/presentationml/2006/main">
   <p:cSld>
     <p:spTree>
@@ -16424,7 +17246,7 @@
             <a:fld id="{8C8FEA95-401B-4A59-A0C9-740C061053CF}" type="slidenum">
               <a:rPr lang="de-DE" smtClean="0"/>
               <a:pPr/>
-              <a:t>5</a:t>
+              <a:t>6</a:t>
             </a:fld>
             <a:endParaRPr lang="de-DE"/>
           </a:p>
@@ -16826,7 +17648,7 @@
 </p:sld>
 </file>
 
-<file path=ppt/slides/slide6.xml><?xml version="1.0" encoding="utf-8"?>
+<file path=ppt/slides/slide7.xml><?xml version="1.0" encoding="utf-8"?>
 <p:sld xmlns:a="http://schemas.openxmlformats.org/drawingml/2006/main" xmlns:r="http://schemas.openxmlformats.org/officeDocument/2006/relationships" xmlns:p="http://schemas.openxmlformats.org/presentationml/2006/main">
   <p:cSld>
     <p:spTree>
@@ -17126,7 +17948,7 @@
             <a:fld id="{8C8FEA95-401B-4A59-A0C9-740C061053CF}" type="slidenum">
               <a:rPr lang="de-DE" smtClean="0"/>
               <a:pPr/>
-              <a:t>6</a:t>
+              <a:t>7</a:t>
             </a:fld>
             <a:endParaRPr lang="de-DE"/>
           </a:p>
@@ -17374,7 +18196,7 @@
 </p:sld>
 </file>
 
-<file path=ppt/slides/slide7.xml><?xml version="1.0" encoding="utf-8"?>
+<file path=ppt/slides/slide8.xml><?xml version="1.0" encoding="utf-8"?>
 <p:sld xmlns:a="http://schemas.openxmlformats.org/drawingml/2006/main" xmlns:r="http://schemas.openxmlformats.org/officeDocument/2006/relationships" xmlns:p="http://schemas.openxmlformats.org/presentationml/2006/main">
   <p:cSld>
     <p:spTree>
@@ -17886,7 +18708,7 @@
             <a:fld id="{8C8FEA95-401B-4A59-A0C9-740C061053CF}" type="slidenum">
               <a:rPr lang="de-DE" smtClean="0"/>
               <a:pPr/>
-              <a:t>7</a:t>
+              <a:t>8</a:t>
             </a:fld>
             <a:endParaRPr lang="de-DE"/>
           </a:p>
@@ -18240,7 +19062,7 @@
 </p:sld>
 </file>
 
-<file path=ppt/slides/slide8.xml><?xml version="1.0" encoding="utf-8"?>
+<file path=ppt/slides/slide9.xml><?xml version="1.0" encoding="utf-8"?>
 <p:sld xmlns:a="http://schemas.openxmlformats.org/drawingml/2006/main" xmlns:r="http://schemas.openxmlformats.org/officeDocument/2006/relationships" xmlns:p="http://schemas.openxmlformats.org/presentationml/2006/main">
   <p:cSld>
     <p:spTree>
@@ -18842,7 +19664,7 @@
             <a:fld id="{8C8FEA95-401B-4A59-A0C9-740C061053CF}" type="slidenum">
               <a:rPr lang="de-DE" smtClean="0"/>
               <a:pPr/>
-              <a:t>8</a:t>
+              <a:t>9</a:t>
             </a:fld>
             <a:endParaRPr lang="de-DE"/>
           </a:p>
@@ -19290,601 +20112,6 @@
                                           <p:spTgt spid="3">
                                             <p:txEl>
                                               <p:pRg st="11" end="11"/>
-                                            </p:txEl>
-                                          </p:spTgt>
-                                        </p:tgtEl>
-                                        <p:attrNameLst>
-                                          <p:attrName>style.visibility</p:attrName>
-                                        </p:attrNameLst>
-                                      </p:cBhvr>
-                                      <p:to>
-                                        <p:strVal val="visible"/>
-                                      </p:to>
-                                    </p:set>
-                                  </p:childTnLst>
-                                </p:cTn>
-                              </p:par>
-                            </p:childTnLst>
-                          </p:cTn>
-                        </p:par>
-                      </p:childTnLst>
-                    </p:cTn>
-                  </p:par>
-                </p:childTnLst>
-              </p:cTn>
-              <p:prevCondLst>
-                <p:cond evt="onPrev" delay="0">
-                  <p:tgtEl>
-                    <p:sldTgt/>
-                  </p:tgtEl>
-                </p:cond>
-              </p:prevCondLst>
-              <p:nextCondLst>
-                <p:cond evt="onNext" delay="0">
-                  <p:tgtEl>
-                    <p:sldTgt/>
-                  </p:tgtEl>
-                </p:cond>
-              </p:nextCondLst>
-            </p:seq>
-          </p:childTnLst>
-        </p:cTn>
-      </p:par>
-    </p:tnLst>
-    <p:bldLst>
-      <p:bldP spid="3" grpId="0" build="p"/>
-    </p:bldLst>
-  </p:timing>
-</p:sld>
-</file>
-
-<file path=ppt/slides/slide9.xml><?xml version="1.0" encoding="utf-8"?>
-<p:sld xmlns:a="http://schemas.openxmlformats.org/drawingml/2006/main" xmlns:r="http://schemas.openxmlformats.org/officeDocument/2006/relationships" xmlns:p="http://schemas.openxmlformats.org/presentationml/2006/main">
-  <p:cSld>
-    <p:spTree>
-      <p:nvGrpSpPr>
-        <p:cNvPr id="1" name=""/>
-        <p:cNvGrpSpPr/>
-        <p:nvPr/>
-      </p:nvGrpSpPr>
-      <p:grpSpPr>
-        <a:xfrm>
-          <a:off x="0" y="0"/>
-          <a:ext cx="0" cy="0"/>
-          <a:chOff x="0" y="0"/>
-          <a:chExt cx="0" cy="0"/>
-        </a:xfrm>
-      </p:grpSpPr>
-      <p:sp>
-        <p:nvSpPr>
-          <p:cNvPr id="2" name="Title 1">
-            <a:extLst>
-              <a:ext uri="{FF2B5EF4-FFF2-40B4-BE49-F238E27FC236}">
-                <a16:creationId xmlns:a16="http://schemas.microsoft.com/office/drawing/2014/main" id="{DF865123-2C10-BF4A-BF77-9B54C236C756}"/>
-              </a:ext>
-            </a:extLst>
-          </p:cNvPr>
-          <p:cNvSpPr>
-            <a:spLocks noGrp="1"/>
-          </p:cNvSpPr>
-          <p:nvPr>
-            <p:ph type="title"/>
-          </p:nvPr>
-        </p:nvSpPr>
-        <p:spPr/>
-        <p:txBody>
-          <a:bodyPr/>
-          <a:lstStyle/>
-          <a:p>
-            <a:r>
-              <a:rPr lang="de-DE" dirty="0"/>
-              <a:t>Experiment Setup</a:t>
-            </a:r>
-          </a:p>
-        </p:txBody>
-      </p:sp>
-      <p:sp>
-        <p:nvSpPr>
-          <p:cNvPr id="3" name="Content Placeholder 2">
-            <a:extLst>
-              <a:ext uri="{FF2B5EF4-FFF2-40B4-BE49-F238E27FC236}">
-                <a16:creationId xmlns:a16="http://schemas.microsoft.com/office/drawing/2014/main" id="{CDEA8190-97B7-3842-9323-4F53B7DC0BFC}"/>
-              </a:ext>
-            </a:extLst>
-          </p:cNvPr>
-          <p:cNvSpPr>
-            <a:spLocks noGrp="1"/>
-          </p:cNvSpPr>
-          <p:nvPr>
-            <p:ph sz="half" idx="1"/>
-          </p:nvPr>
-        </p:nvSpPr>
-        <p:spPr>
-          <a:xfrm>
-            <a:off x="445760" y="1701006"/>
-            <a:ext cx="8183563" cy="4319587"/>
-          </a:xfrm>
-        </p:spPr>
-        <p:txBody>
-          <a:bodyPr/>
-          <a:lstStyle/>
-          <a:p>
-            <a:r>
-              <a:rPr lang="de-DE" dirty="0" err="1"/>
-              <a:t>Algorithm</a:t>
-            </a:r>
-            <a:r>
-              <a:rPr lang="de-DE" dirty="0"/>
-              <a:t>: TD3 </a:t>
-            </a:r>
-            <a:r>
-              <a:rPr lang="de-DE" dirty="0" err="1"/>
-              <a:t>of</a:t>
-            </a:r>
-            <a:r>
-              <a:rPr lang="de-DE" dirty="0"/>
-              <a:t> </a:t>
-            </a:r>
-            <a:r>
-              <a:rPr lang="de-DE" dirty="0" err="1"/>
-              <a:t>stable-baselines</a:t>
-            </a:r>
-            <a:r>
-              <a:rPr lang="de-DE" dirty="0"/>
-              <a:t> </a:t>
-            </a:r>
-          </a:p>
-          <a:p>
-            <a:r>
-              <a:rPr lang="de-DE" dirty="0" err="1"/>
-              <a:t>Pendulum</a:t>
-            </a:r>
-            <a:r>
-              <a:rPr lang="de-DE" dirty="0"/>
-              <a:t> </a:t>
-            </a:r>
-            <a:r>
-              <a:rPr lang="de-DE" dirty="0" err="1"/>
-              <a:t>Env</a:t>
-            </a:r>
-            <a:r>
-              <a:rPr lang="de-DE" dirty="0"/>
-              <a:t> </a:t>
-            </a:r>
-            <a:r>
-              <a:rPr lang="de-DE" dirty="0" err="1"/>
-              <a:t>from</a:t>
-            </a:r>
-            <a:r>
-              <a:rPr lang="de-DE" dirty="0"/>
-              <a:t> </a:t>
-            </a:r>
-            <a:r>
-              <a:rPr lang="de-DE" dirty="0" err="1"/>
-              <a:t>OpenAI</a:t>
-            </a:r>
-            <a:r>
-              <a:rPr lang="de-DE" dirty="0"/>
-              <a:t> </a:t>
-            </a:r>
-            <a:r>
-              <a:rPr lang="de-DE" dirty="0" err="1"/>
-              <a:t>Gym</a:t>
-            </a:r>
-            <a:endParaRPr lang="de-DE" dirty="0"/>
-          </a:p>
-          <a:p>
-            <a:r>
-              <a:rPr lang="de-DE" dirty="0" err="1"/>
-              <a:t>Ant</a:t>
-            </a:r>
-            <a:r>
-              <a:rPr lang="de-DE" dirty="0"/>
-              <a:t> </a:t>
-            </a:r>
-            <a:r>
-              <a:rPr lang="de-DE" dirty="0" err="1"/>
-              <a:t>Env</a:t>
-            </a:r>
-            <a:r>
-              <a:rPr lang="de-DE" dirty="0"/>
-              <a:t> </a:t>
-            </a:r>
-            <a:r>
-              <a:rPr lang="de-DE" dirty="0" err="1"/>
-              <a:t>from</a:t>
-            </a:r>
-            <a:r>
-              <a:rPr lang="de-DE" dirty="0"/>
-              <a:t> </a:t>
-            </a:r>
-            <a:r>
-              <a:rPr lang="de-DE" dirty="0" err="1"/>
-              <a:t>PyBullet</a:t>
-            </a:r>
-            <a:r>
-              <a:rPr lang="de-DE" dirty="0"/>
-              <a:t> </a:t>
-            </a:r>
-            <a:r>
-              <a:rPr lang="de-DE" dirty="0" err="1"/>
-              <a:t>Gym</a:t>
-            </a:r>
-            <a:r>
-              <a:rPr lang="de-DE" dirty="0"/>
-              <a:t> </a:t>
-            </a:r>
-          </a:p>
-          <a:p>
-            <a:r>
-              <a:rPr lang="de-DE" dirty="0" err="1"/>
-              <a:t>Running</a:t>
-            </a:r>
-            <a:r>
-              <a:rPr lang="de-DE" dirty="0"/>
-              <a:t> on Google </a:t>
-            </a:r>
-            <a:r>
-              <a:rPr lang="de-DE" dirty="0" err="1"/>
-              <a:t>Colab</a:t>
-            </a:r>
-            <a:endParaRPr lang="de-DE" dirty="0"/>
-          </a:p>
-          <a:p>
-            <a:r>
-              <a:rPr lang="de-DE" dirty="0" err="1"/>
-              <a:t>Logging</a:t>
-            </a:r>
-            <a:r>
-              <a:rPr lang="de-DE" dirty="0"/>
-              <a:t> </a:t>
-            </a:r>
-            <a:r>
-              <a:rPr lang="de-DE" dirty="0" err="1"/>
-              <a:t>with</a:t>
-            </a:r>
-            <a:r>
-              <a:rPr lang="de-DE" dirty="0"/>
-              <a:t> </a:t>
-            </a:r>
-            <a:r>
-              <a:rPr lang="de-DE" dirty="0" err="1"/>
-              <a:t>Tensorboard</a:t>
-            </a:r>
-            <a:endParaRPr lang="de-DE" dirty="0"/>
-          </a:p>
-        </p:txBody>
-      </p:sp>
-      <p:sp>
-        <p:nvSpPr>
-          <p:cNvPr id="5" name="Date Placeholder 4">
-            <a:extLst>
-              <a:ext uri="{FF2B5EF4-FFF2-40B4-BE49-F238E27FC236}">
-                <a16:creationId xmlns:a16="http://schemas.microsoft.com/office/drawing/2014/main" id="{627465B1-4176-084B-9F72-6B1F144F719E}"/>
-              </a:ext>
-            </a:extLst>
-          </p:cNvPr>
-          <p:cNvSpPr>
-            <a:spLocks noGrp="1"/>
-          </p:cNvSpPr>
-          <p:nvPr>
-            <p:ph type="dt" sz="half" idx="10"/>
-          </p:nvPr>
-        </p:nvSpPr>
-        <p:spPr/>
-        <p:txBody>
-          <a:bodyPr/>
-          <a:lstStyle/>
-          <a:p>
-            <a:r>
-              <a:rPr lang="de-DE"/>
-              <a:t>15. Januar 2020</a:t>
-            </a:r>
-          </a:p>
-        </p:txBody>
-      </p:sp>
-      <p:sp>
-        <p:nvSpPr>
-          <p:cNvPr id="6" name="Footer Placeholder 5">
-            <a:extLst>
-              <a:ext uri="{FF2B5EF4-FFF2-40B4-BE49-F238E27FC236}">
-                <a16:creationId xmlns:a16="http://schemas.microsoft.com/office/drawing/2014/main" id="{C55863B1-EF29-9F40-85EA-CEAE4DB87186}"/>
-              </a:ext>
-            </a:extLst>
-          </p:cNvPr>
-          <p:cNvSpPr>
-            <a:spLocks noGrp="1"/>
-          </p:cNvSpPr>
-          <p:nvPr>
-            <p:ph type="ftr" sz="quarter" idx="11"/>
-          </p:nvPr>
-        </p:nvSpPr>
-        <p:spPr/>
-        <p:txBody>
-          <a:bodyPr/>
-          <a:lstStyle/>
-          <a:p>
-            <a:r>
-              <a:rPr lang="de-DE" b="1"/>
-              <a:t>Deep Reinforcement Learning: TD3</a:t>
-            </a:r>
-            <a:endParaRPr lang="de-DE" b="1" dirty="0"/>
-          </a:p>
-        </p:txBody>
-      </p:sp>
-      <p:sp>
-        <p:nvSpPr>
-          <p:cNvPr id="7" name="Slide Number Placeholder 6">
-            <a:extLst>
-              <a:ext uri="{FF2B5EF4-FFF2-40B4-BE49-F238E27FC236}">
-                <a16:creationId xmlns:a16="http://schemas.microsoft.com/office/drawing/2014/main" id="{2652E1AA-712F-CD4C-9955-CA08C5790D94}"/>
-              </a:ext>
-            </a:extLst>
-          </p:cNvPr>
-          <p:cNvSpPr>
-            <a:spLocks noGrp="1"/>
-          </p:cNvSpPr>
-          <p:nvPr>
-            <p:ph type="sldNum" sz="quarter" idx="12"/>
-          </p:nvPr>
-        </p:nvSpPr>
-        <p:spPr/>
-        <p:txBody>
-          <a:bodyPr/>
-          <a:lstStyle/>
-          <a:p>
-            <a:fld id="{8C8FEA95-401B-4A59-A0C9-740C061053CF}" type="slidenum">
-              <a:rPr lang="de-DE" smtClean="0"/>
-              <a:pPr/>
-              <a:t>9</a:t>
-            </a:fld>
-            <a:endParaRPr lang="de-DE"/>
-          </a:p>
-        </p:txBody>
-      </p:sp>
-    </p:spTree>
-    <p:extLst>
-      <p:ext uri="{BB962C8B-B14F-4D97-AF65-F5344CB8AC3E}">
-        <p14:creationId xmlns:p14="http://schemas.microsoft.com/office/powerpoint/2010/main" val="429526192"/>
-      </p:ext>
-    </p:extLst>
-  </p:cSld>
-  <p:clrMapOvr>
-    <a:masterClrMapping/>
-  </p:clrMapOvr>
-  <p:timing>
-    <p:tnLst>
-      <p:par>
-        <p:cTn id="1" dur="indefinite" restart="never" nodeType="tmRoot">
-          <p:childTnLst>
-            <p:seq concurrent="1" nextAc="seek">
-              <p:cTn id="2" dur="indefinite" nodeType="mainSeq">
-                <p:childTnLst>
-                  <p:par>
-                    <p:cTn id="3" fill="hold">
-                      <p:stCondLst>
-                        <p:cond delay="indefinite"/>
-                      </p:stCondLst>
-                      <p:childTnLst>
-                        <p:par>
-                          <p:cTn id="4" fill="hold">
-                            <p:stCondLst>
-                              <p:cond delay="0"/>
-                            </p:stCondLst>
-                            <p:childTnLst>
-                              <p:par>
-                                <p:cTn id="5" presetID="1" presetClass="entr" presetSubtype="0" fill="hold" grpId="0" nodeType="clickEffect">
-                                  <p:stCondLst>
-                                    <p:cond delay="0"/>
-                                  </p:stCondLst>
-                                  <p:childTnLst>
-                                    <p:set>
-                                      <p:cBhvr>
-                                        <p:cTn id="6" dur="1" fill="hold">
-                                          <p:stCondLst>
-                                            <p:cond delay="0"/>
-                                          </p:stCondLst>
-                                        </p:cTn>
-                                        <p:tgtEl>
-                                          <p:spTgt spid="3">
-                                            <p:txEl>
-                                              <p:pRg st="0" end="0"/>
-                                            </p:txEl>
-                                          </p:spTgt>
-                                        </p:tgtEl>
-                                        <p:attrNameLst>
-                                          <p:attrName>style.visibility</p:attrName>
-                                        </p:attrNameLst>
-                                      </p:cBhvr>
-                                      <p:to>
-                                        <p:strVal val="visible"/>
-                                      </p:to>
-                                    </p:set>
-                                  </p:childTnLst>
-                                </p:cTn>
-                              </p:par>
-                            </p:childTnLst>
-                          </p:cTn>
-                        </p:par>
-                      </p:childTnLst>
-                    </p:cTn>
-                  </p:par>
-                  <p:par>
-                    <p:cTn id="7" fill="hold">
-                      <p:stCondLst>
-                        <p:cond delay="indefinite"/>
-                      </p:stCondLst>
-                      <p:childTnLst>
-                        <p:par>
-                          <p:cTn id="8" fill="hold">
-                            <p:stCondLst>
-                              <p:cond delay="0"/>
-                            </p:stCondLst>
-                            <p:childTnLst>
-                              <p:par>
-                                <p:cTn id="9" presetID="1" presetClass="entr" presetSubtype="0" fill="hold" grpId="0" nodeType="clickEffect">
-                                  <p:stCondLst>
-                                    <p:cond delay="0"/>
-                                  </p:stCondLst>
-                                  <p:childTnLst>
-                                    <p:set>
-                                      <p:cBhvr>
-                                        <p:cTn id="10" dur="1" fill="hold">
-                                          <p:stCondLst>
-                                            <p:cond delay="0"/>
-                                          </p:stCondLst>
-                                        </p:cTn>
-                                        <p:tgtEl>
-                                          <p:spTgt spid="3">
-                                            <p:txEl>
-                                              <p:pRg st="1" end="1"/>
-                                            </p:txEl>
-                                          </p:spTgt>
-                                        </p:tgtEl>
-                                        <p:attrNameLst>
-                                          <p:attrName>style.visibility</p:attrName>
-                                        </p:attrNameLst>
-                                      </p:cBhvr>
-                                      <p:to>
-                                        <p:strVal val="visible"/>
-                                      </p:to>
-                                    </p:set>
-                                  </p:childTnLst>
-                                </p:cTn>
-                              </p:par>
-                            </p:childTnLst>
-                          </p:cTn>
-                        </p:par>
-                      </p:childTnLst>
-                    </p:cTn>
-                  </p:par>
-                  <p:par>
-                    <p:cTn id="11" fill="hold">
-                      <p:stCondLst>
-                        <p:cond delay="indefinite"/>
-                      </p:stCondLst>
-                      <p:childTnLst>
-                        <p:par>
-                          <p:cTn id="12" fill="hold">
-                            <p:stCondLst>
-                              <p:cond delay="0"/>
-                            </p:stCondLst>
-                            <p:childTnLst>
-                              <p:par>
-                                <p:cTn id="13" presetID="1" presetClass="entr" presetSubtype="0" fill="hold" grpId="0" nodeType="clickEffect">
-                                  <p:stCondLst>
-                                    <p:cond delay="0"/>
-                                  </p:stCondLst>
-                                  <p:childTnLst>
-                                    <p:set>
-                                      <p:cBhvr>
-                                        <p:cTn id="14" dur="1" fill="hold">
-                                          <p:stCondLst>
-                                            <p:cond delay="0"/>
-                                          </p:stCondLst>
-                                        </p:cTn>
-                                        <p:tgtEl>
-                                          <p:spTgt spid="3">
-                                            <p:txEl>
-                                              <p:pRg st="2" end="2"/>
-                                            </p:txEl>
-                                          </p:spTgt>
-                                        </p:tgtEl>
-                                        <p:attrNameLst>
-                                          <p:attrName>style.visibility</p:attrName>
-                                        </p:attrNameLst>
-                                      </p:cBhvr>
-                                      <p:to>
-                                        <p:strVal val="visible"/>
-                                      </p:to>
-                                    </p:set>
-                                  </p:childTnLst>
-                                </p:cTn>
-                              </p:par>
-                            </p:childTnLst>
-                          </p:cTn>
-                        </p:par>
-                      </p:childTnLst>
-                    </p:cTn>
-                  </p:par>
-                  <p:par>
-                    <p:cTn id="15" fill="hold">
-                      <p:stCondLst>
-                        <p:cond delay="indefinite"/>
-                      </p:stCondLst>
-                      <p:childTnLst>
-                        <p:par>
-                          <p:cTn id="16" fill="hold">
-                            <p:stCondLst>
-                              <p:cond delay="0"/>
-                            </p:stCondLst>
-                            <p:childTnLst>
-                              <p:par>
-                                <p:cTn id="17" presetID="1" presetClass="entr" presetSubtype="0" fill="hold" grpId="0" nodeType="clickEffect">
-                                  <p:stCondLst>
-                                    <p:cond delay="0"/>
-                                  </p:stCondLst>
-                                  <p:childTnLst>
-                                    <p:set>
-                                      <p:cBhvr>
-                                        <p:cTn id="18" dur="1" fill="hold">
-                                          <p:stCondLst>
-                                            <p:cond delay="0"/>
-                                          </p:stCondLst>
-                                        </p:cTn>
-                                        <p:tgtEl>
-                                          <p:spTgt spid="3">
-                                            <p:txEl>
-                                              <p:pRg st="3" end="3"/>
-                                            </p:txEl>
-                                          </p:spTgt>
-                                        </p:tgtEl>
-                                        <p:attrNameLst>
-                                          <p:attrName>style.visibility</p:attrName>
-                                        </p:attrNameLst>
-                                      </p:cBhvr>
-                                      <p:to>
-                                        <p:strVal val="visible"/>
-                                      </p:to>
-                                    </p:set>
-                                  </p:childTnLst>
-                                </p:cTn>
-                              </p:par>
-                            </p:childTnLst>
-                          </p:cTn>
-                        </p:par>
-                      </p:childTnLst>
-                    </p:cTn>
-                  </p:par>
-                  <p:par>
-                    <p:cTn id="19" fill="hold">
-                      <p:stCondLst>
-                        <p:cond delay="indefinite"/>
-                      </p:stCondLst>
-                      <p:childTnLst>
-                        <p:par>
-                          <p:cTn id="20" fill="hold">
-                            <p:stCondLst>
-                              <p:cond delay="0"/>
-                            </p:stCondLst>
-                            <p:childTnLst>
-                              <p:par>
-                                <p:cTn id="21" presetID="1" presetClass="entr" presetSubtype="0" fill="hold" grpId="0" nodeType="clickEffect">
-                                  <p:stCondLst>
-                                    <p:cond delay="0"/>
-                                  </p:stCondLst>
-                                  <p:childTnLst>
-                                    <p:set>
-                                      <p:cBhvr>
-                                        <p:cTn id="22" dur="1" fill="hold">
-                                          <p:stCondLst>
-                                            <p:cond delay="0"/>
-                                          </p:stCondLst>
-                                        </p:cTn>
-                                        <p:tgtEl>
-                                          <p:spTgt spid="3">
-                                            <p:txEl>
-                                              <p:pRg st="4" end="4"/>
                                             </p:txEl>
                                           </p:spTgt>
                                         </p:tgtEl>

</xml_diff>